<commit_message>
restore deleted files and replace older files
</commit_message>
<xml_diff>
--- a/lab1/py27/lab1_introduction_to_python.pptx
+++ b/lab1/py27/lab1_introduction_to_python.pptx
@@ -2,7 +2,7 @@
 <file path=ppt/presentation.xml><?xml version="1.0" encoding="utf-8"?>
 <p:presentation xmlns:a="http://schemas.openxmlformats.org/drawingml/2006/main" xmlns:r="http://schemas.openxmlformats.org/officeDocument/2006/relationships" xmlns:p="http://schemas.openxmlformats.org/presentationml/2006/main" saveSubsetFonts="1">
   <p:sldMasterIdLst>
-    <p:sldMasterId id="2147483648" r:id="rId1"/>
+    <p:sldMasterId id="2147483660" r:id="rId1"/>
   </p:sldMasterIdLst>
   <p:notesMasterIdLst>
     <p:notesMasterId r:id="rId67"/>
@@ -171,6 +171,22 @@
       </a:defRPr>
     </a:lvl9pPr>
   </p:defaultTextStyle>
+  <p:extLst>
+    <p:ext uri="{EFAFB233-063F-42B5-8137-9DF3F51BA10A}">
+      <p15:sldGuideLst xmlns:p15="http://schemas.microsoft.com/office/powerpoint/2012/main">
+        <p15:guide id="1" orient="horz" pos="2160">
+          <p15:clr>
+            <a:srgbClr val="A4A3A4"/>
+          </p15:clr>
+        </p15:guide>
+        <p15:guide id="2" pos="2880">
+          <p15:clr>
+            <a:srgbClr val="A4A3A4"/>
+          </p15:clr>
+        </p15:guide>
+      </p15:sldGuideLst>
+    </p:ext>
+  </p:extLst>
 </p:presentation>
 </file>
 
@@ -256,7 +272,7 @@
           <a:p>
             <a:fld id="{B5304A39-1557-4E6E-84CD-682DA3CA00B4}" type="datetimeFigureOut">
               <a:rPr lang="en-US" smtClean="0"/>
-              <a:t>9/6/2016</a:t>
+              <a:t>9/4/17</a:t>
             </a:fld>
             <a:endParaRPr lang="en-US" dirty="0"/>
           </a:p>
@@ -578,8 +594,41 @@
             </a:r>
             <a:r>
               <a:rPr lang="en-US" dirty="0" smtClean="0"/>
-              <a:t>!</a:t>
-            </a:r>
+              <a:t>! Thank you to Sarah Middleton for creating and making</a:t>
+            </a:r>
+            <a:r>
+              <a:rPr lang="en-US" baseline="0" dirty="0" smtClean="0"/>
+              <a:t> this workshop possible. This is the first time the workshop will be held without her, and it will be trial and </a:t>
+            </a:r>
+            <a:r>
+              <a:rPr lang="en-US" baseline="0" dirty="0" smtClean="0"/>
+              <a:t>error process. </a:t>
+            </a:r>
+            <a:r>
+              <a:rPr lang="en-US" baseline="0" dirty="0" smtClean="0"/>
+              <a:t>So I </a:t>
+            </a:r>
+            <a:r>
+              <a:rPr lang="en-US" baseline="0" dirty="0" smtClean="0"/>
+              <a:t>apologize </a:t>
+            </a:r>
+            <a:r>
+              <a:rPr lang="en-US" baseline="0" dirty="0" smtClean="0"/>
+              <a:t>in advanced and thank everyone for their patience. We will be doing things a bit differently. There wont be one single lecturer. GCB students and </a:t>
+            </a:r>
+            <a:r>
+              <a:rPr lang="en-US" baseline="0" dirty="0" err="1" smtClean="0"/>
+              <a:t>Tas</a:t>
+            </a:r>
+            <a:r>
+              <a:rPr lang="en-US" baseline="0" dirty="0" smtClean="0"/>
+              <a:t> will </a:t>
+            </a:r>
+            <a:r>
+              <a:rPr lang="en-US" baseline="0" dirty="0" smtClean="0"/>
+              <a:t>be providing help through out the course.</a:t>
+            </a:r>
+            <a:endParaRPr lang="en-US" dirty="0" smtClean="0"/>
           </a:p>
           <a:p>
             <a:r>
@@ -587,10 +636,13 @@
               <a:t>http://</a:t>
             </a:r>
             <a:r>
-              <a:rPr lang="en-US" smtClean="0"/>
-              <a:t>upibi.org/</a:t>
-            </a:r>
-            <a:endParaRPr lang="en-US" dirty="0" smtClean="0"/>
+              <a:rPr lang="en-US" dirty="0" err="1" smtClean="0"/>
+              <a:t>upibi.org</a:t>
+            </a:r>
+            <a:r>
+              <a:rPr lang="en-US" dirty="0" smtClean="0"/>
+              <a:t>/</a:t>
+            </a:r>
           </a:p>
         </p:txBody>
       </p:sp>
@@ -3920,7 +3972,76 @@
           <a:p>
             <a:r>
               <a:rPr lang="en-US" baseline="0" dirty="0" smtClean="0"/>
-              <a:t>"comments" "reserved words" and "built-in functions" will be explained later</a:t>
+              <a:t>"comments" "reserved words" and "built-in functions" will be explained </a:t>
+            </a:r>
+            <a:r>
+              <a:rPr lang="en-US" baseline="0" dirty="0" smtClean="0"/>
+              <a:t>later</a:t>
+            </a:r>
+          </a:p>
+          <a:p>
+            <a:endParaRPr lang="en-US" baseline="0" dirty="0" smtClean="0"/>
+          </a:p>
+          <a:p>
+            <a:r>
+              <a:rPr lang="en-US" sz="1200" b="0" i="0" kern="1200" dirty="0" smtClean="0">
+                <a:solidFill>
+                  <a:schemeClr val="tx1"/>
+                </a:solidFill>
+                <a:effectLst/>
+                <a:latin typeface="+mn-lt"/>
+                <a:ea typeface="+mn-ea"/>
+                <a:cs typeface="+mn-cs"/>
+              </a:rPr>
+              <a:t> </a:t>
+            </a:r>
+            <a:r>
+              <a:rPr lang="en-US" sz="1200" b="1" i="0" kern="1200" dirty="0" smtClean="0">
+                <a:solidFill>
+                  <a:schemeClr val="tx1"/>
+                </a:solidFill>
+                <a:effectLst/>
+                <a:latin typeface="+mn-lt"/>
+                <a:ea typeface="+mn-ea"/>
+                <a:cs typeface="+mn-cs"/>
+              </a:rPr>
+              <a:t>Reserved words</a:t>
+            </a:r>
+            <a:r>
+              <a:rPr lang="en-US" sz="1200" b="0" i="0" kern="1200" dirty="0" smtClean="0">
+                <a:solidFill>
+                  <a:schemeClr val="tx1"/>
+                </a:solidFill>
+                <a:effectLst/>
+                <a:latin typeface="+mn-lt"/>
+                <a:ea typeface="+mn-ea"/>
+                <a:cs typeface="+mn-cs"/>
+              </a:rPr>
+              <a:t> are </a:t>
+            </a:r>
+            <a:r>
+              <a:rPr lang="en-US" sz="1200" b="1" i="0" kern="1200" dirty="0" smtClean="0">
+                <a:solidFill>
+                  <a:schemeClr val="tx1"/>
+                </a:solidFill>
+                <a:effectLst/>
+                <a:latin typeface="+mn-lt"/>
+                <a:ea typeface="+mn-ea"/>
+                <a:cs typeface="+mn-cs"/>
+              </a:rPr>
+              <a:t>words</a:t>
+            </a:r>
+            <a:r>
+              <a:rPr lang="en-US" sz="1200" b="0" i="0" kern="1200" dirty="0" smtClean="0">
+                <a:solidFill>
+                  <a:schemeClr val="tx1"/>
+                </a:solidFill>
+                <a:effectLst/>
+                <a:latin typeface="+mn-lt"/>
+                <a:ea typeface="+mn-ea"/>
+                <a:cs typeface="+mn-cs"/>
+              </a:rPr>
+              <a:t> that cannot be used as identifiers </a:t>
             </a:r>
             <a:endParaRPr lang="en-US" dirty="0"/>
           </a:p>
@@ -6812,13 +6933,17 @@
         </p:nvSpPr>
         <p:spPr>
           <a:xfrm>
-            <a:off x="685800" y="2130425"/>
-            <a:ext cx="7772400" cy="1470025"/>
+            <a:off x="1143000" y="1122363"/>
+            <a:ext cx="6858000" cy="2387600"/>
           </a:xfrm>
         </p:spPr>
         <p:txBody>
-          <a:bodyPr/>
-          <a:lstStyle/>
+          <a:bodyPr anchor="b"/>
+          <a:lstStyle>
+            <a:lvl1pPr algn="ctr">
+              <a:defRPr sz="4500"/>
+            </a:lvl1pPr>
+          </a:lstStyle>
           <a:p>
             <a:r>
               <a:rPr lang="en-US" smtClean="0"/>
@@ -6840,8 +6965,8 @@
         </p:nvSpPr>
         <p:spPr>
           <a:xfrm>
-            <a:off x="1371600" y="3886200"/>
-            <a:ext cx="6400800" cy="1752600"/>
+            <a:off x="1143000" y="3602038"/>
+            <a:ext cx="6858000" cy="1655762"/>
           </a:xfrm>
         </p:spPr>
         <p:txBody>
@@ -6849,93 +6974,39 @@
           <a:lstStyle>
             <a:lvl1pPr marL="0" indent="0" algn="ctr">
               <a:buNone/>
-              <a:defRPr>
-                <a:solidFill>
-                  <a:schemeClr val="tx1">
-                    <a:tint val="75000"/>
-                  </a:schemeClr>
-                </a:solidFill>
-              </a:defRPr>
+              <a:defRPr sz="1800"/>
             </a:lvl1pPr>
-            <a:lvl2pPr marL="457200" indent="0" algn="ctr">
+            <a:lvl2pPr marL="342900" indent="0" algn="ctr">
               <a:buNone/>
-              <a:defRPr>
-                <a:solidFill>
-                  <a:schemeClr val="tx1">
-                    <a:tint val="75000"/>
-                  </a:schemeClr>
-                </a:solidFill>
-              </a:defRPr>
+              <a:defRPr sz="1500"/>
             </a:lvl2pPr>
-            <a:lvl3pPr marL="914400" indent="0" algn="ctr">
+            <a:lvl3pPr marL="685800" indent="0" algn="ctr">
               <a:buNone/>
-              <a:defRPr>
-                <a:solidFill>
-                  <a:schemeClr val="tx1">
-                    <a:tint val="75000"/>
-                  </a:schemeClr>
-                </a:solidFill>
-              </a:defRPr>
+              <a:defRPr sz="1350"/>
             </a:lvl3pPr>
-            <a:lvl4pPr marL="1371600" indent="0" algn="ctr">
+            <a:lvl4pPr marL="1028700" indent="0" algn="ctr">
               <a:buNone/>
-              <a:defRPr>
-                <a:solidFill>
-                  <a:schemeClr val="tx1">
-                    <a:tint val="75000"/>
-                  </a:schemeClr>
-                </a:solidFill>
-              </a:defRPr>
+              <a:defRPr sz="1200"/>
             </a:lvl4pPr>
-            <a:lvl5pPr marL="1828800" indent="0" algn="ctr">
+            <a:lvl5pPr marL="1371600" indent="0" algn="ctr">
               <a:buNone/>
-              <a:defRPr>
-                <a:solidFill>
-                  <a:schemeClr val="tx1">
-                    <a:tint val="75000"/>
-                  </a:schemeClr>
-                </a:solidFill>
-              </a:defRPr>
+              <a:defRPr sz="1200"/>
             </a:lvl5pPr>
-            <a:lvl6pPr marL="2286000" indent="0" algn="ctr">
+            <a:lvl6pPr marL="1714500" indent="0" algn="ctr">
               <a:buNone/>
-              <a:defRPr>
-                <a:solidFill>
-                  <a:schemeClr val="tx1">
-                    <a:tint val="75000"/>
-                  </a:schemeClr>
-                </a:solidFill>
-              </a:defRPr>
+              <a:defRPr sz="1200"/>
             </a:lvl6pPr>
-            <a:lvl7pPr marL="2743200" indent="0" algn="ctr">
+            <a:lvl7pPr marL="2057400" indent="0" algn="ctr">
               <a:buNone/>
-              <a:defRPr>
-                <a:solidFill>
-                  <a:schemeClr val="tx1">
-                    <a:tint val="75000"/>
-                  </a:schemeClr>
-                </a:solidFill>
-              </a:defRPr>
+              <a:defRPr sz="1200"/>
             </a:lvl7pPr>
-            <a:lvl8pPr marL="3200400" indent="0" algn="ctr">
+            <a:lvl8pPr marL="2400300" indent="0" algn="ctr">
               <a:buNone/>
-              <a:defRPr>
-                <a:solidFill>
-                  <a:schemeClr val="tx1">
-                    <a:tint val="75000"/>
-                  </a:schemeClr>
-                </a:solidFill>
-              </a:defRPr>
+              <a:defRPr sz="1200"/>
             </a:lvl8pPr>
-            <a:lvl9pPr marL="3657600" indent="0" algn="ctr">
+            <a:lvl9pPr marL="2743200" indent="0" algn="ctr">
               <a:buNone/>
-              <a:defRPr>
-                <a:solidFill>
-                  <a:schemeClr val="tx1">
-                    <a:tint val="75000"/>
-                  </a:schemeClr>
-                </a:solidFill>
-              </a:defRPr>
+              <a:defRPr sz="1200"/>
             </a:lvl9pPr>
           </a:lstStyle>
           <a:p>
@@ -6964,7 +7035,7 @@
           <a:p>
             <a:fld id="{E556BB2D-78B5-4029-AFF6-A8989315B739}" type="datetime1">
               <a:rPr lang="en-US" smtClean="0"/>
-              <a:t>9/6/2016</a:t>
+              <a:t>9/4/17</a:t>
             </a:fld>
             <a:endParaRPr lang="en-US" dirty="0"/>
           </a:p>
@@ -7015,7 +7086,7 @@
     </p:spTree>
     <p:extLst>
       <p:ext uri="{BB962C8B-B14F-4D97-AF65-F5344CB8AC3E}">
-        <p14:creationId xmlns:p14="http://schemas.microsoft.com/office/powerpoint/2010/main" val="1119524220"/>
+        <p14:creationId xmlns:p14="http://schemas.microsoft.com/office/powerpoint/2010/main" val="1358064357"/>
       </p:ext>
     </p:extLst>
   </p:cSld>
@@ -7134,7 +7205,7 @@
           <a:p>
             <a:fld id="{4E5CB4FE-3285-4003-B189-9E6FF44E49A3}" type="datetime1">
               <a:rPr lang="en-US" smtClean="0"/>
-              <a:t>9/6/2016</a:t>
+              <a:t>9/4/17</a:t>
             </a:fld>
             <a:endParaRPr lang="en-US" dirty="0"/>
           </a:p>
@@ -7185,7 +7256,7 @@
     </p:spTree>
     <p:extLst>
       <p:ext uri="{BB962C8B-B14F-4D97-AF65-F5344CB8AC3E}">
-        <p14:creationId xmlns:p14="http://schemas.microsoft.com/office/powerpoint/2010/main" val="609287700"/>
+        <p14:creationId xmlns:p14="http://schemas.microsoft.com/office/powerpoint/2010/main" val="1299033819"/>
       </p:ext>
     </p:extLst>
   </p:cSld>
@@ -7224,8 +7295,8 @@
         </p:nvSpPr>
         <p:spPr>
           <a:xfrm>
-            <a:off x="6629400" y="274638"/>
-            <a:ext cx="2057400" cy="5851525"/>
+            <a:off x="6543675" y="365125"/>
+            <a:ext cx="1971675" cy="5811838"/>
           </a:xfrm>
         </p:spPr>
         <p:txBody>
@@ -7252,8 +7323,8 @@
         </p:nvSpPr>
         <p:spPr>
           <a:xfrm>
-            <a:off x="457200" y="274638"/>
-            <a:ext cx="6019800" cy="5851525"/>
+            <a:off x="628650" y="365125"/>
+            <a:ext cx="5800725" cy="5811838"/>
           </a:xfrm>
         </p:spPr>
         <p:txBody>
@@ -7314,7 +7385,7 @@
           <a:p>
             <a:fld id="{89C163A8-CF2B-4227-AA3A-BCAE8EBFA63E}" type="datetime1">
               <a:rPr lang="en-US" smtClean="0"/>
-              <a:t>9/6/2016</a:t>
+              <a:t>9/4/17</a:t>
             </a:fld>
             <a:endParaRPr lang="en-US" dirty="0"/>
           </a:p>
@@ -7365,7 +7436,7 @@
     </p:spTree>
     <p:extLst>
       <p:ext uri="{BB962C8B-B14F-4D97-AF65-F5344CB8AC3E}">
-        <p14:creationId xmlns:p14="http://schemas.microsoft.com/office/powerpoint/2010/main" val="1307160153"/>
+        <p14:creationId xmlns:p14="http://schemas.microsoft.com/office/powerpoint/2010/main" val="1542640531"/>
       </p:ext>
     </p:extLst>
   </p:cSld>
@@ -7484,7 +7555,7 @@
           <a:p>
             <a:fld id="{25F940E2-C543-4ABD-BE7C-C8A3F03A98C0}" type="datetime1">
               <a:rPr lang="en-US" smtClean="0"/>
-              <a:t>9/6/2016</a:t>
+              <a:t>9/4/17</a:t>
             </a:fld>
             <a:endParaRPr lang="en-US" dirty="0"/>
           </a:p>
@@ -7535,7 +7606,7 @@
     </p:spTree>
     <p:extLst>
       <p:ext uri="{BB962C8B-B14F-4D97-AF65-F5344CB8AC3E}">
-        <p14:creationId xmlns:p14="http://schemas.microsoft.com/office/powerpoint/2010/main" val="4022041472"/>
+        <p14:creationId xmlns:p14="http://schemas.microsoft.com/office/powerpoint/2010/main" val="1531447783"/>
       </p:ext>
     </p:extLst>
   </p:cSld>
@@ -7574,15 +7645,15 @@
         </p:nvSpPr>
         <p:spPr>
           <a:xfrm>
-            <a:off x="722313" y="4406900"/>
-            <a:ext cx="7772400" cy="1362075"/>
+            <a:off x="623888" y="1709739"/>
+            <a:ext cx="7886700" cy="2852737"/>
           </a:xfrm>
         </p:spPr>
         <p:txBody>
-          <a:bodyPr anchor="t"/>
+          <a:bodyPr anchor="b"/>
           <a:lstStyle>
-            <a:lvl1pPr algn="l">
-              <a:defRPr sz="4000" b="1" cap="all"/>
+            <a:lvl1pPr>
+              <a:defRPr sz="4500"/>
             </a:lvl1pPr>
           </a:lstStyle>
           <a:p>
@@ -7606,24 +7677,14 @@
         </p:nvSpPr>
         <p:spPr>
           <a:xfrm>
-            <a:off x="722313" y="2906713"/>
-            <a:ext cx="7772400" cy="1500187"/>
+            <a:off x="623888" y="4589464"/>
+            <a:ext cx="7886700" cy="1500187"/>
           </a:xfrm>
         </p:spPr>
         <p:txBody>
-          <a:bodyPr anchor="b"/>
+          <a:bodyPr/>
           <a:lstStyle>
             <a:lvl1pPr marL="0" indent="0">
-              <a:buNone/>
-              <a:defRPr sz="2000">
-                <a:solidFill>
-                  <a:schemeClr val="tx1">
-                    <a:tint val="75000"/>
-                  </a:schemeClr>
-                </a:solidFill>
-              </a:defRPr>
-            </a:lvl1pPr>
-            <a:lvl2pPr marL="457200" indent="0">
               <a:buNone/>
               <a:defRPr sz="1800">
                 <a:solidFill>
@@ -7632,10 +7693,20 @@
                   </a:schemeClr>
                 </a:solidFill>
               </a:defRPr>
+            </a:lvl1pPr>
+            <a:lvl2pPr marL="342900" indent="0">
+              <a:buNone/>
+              <a:defRPr sz="1500">
+                <a:solidFill>
+                  <a:schemeClr val="tx1">
+                    <a:tint val="75000"/>
+                  </a:schemeClr>
+                </a:solidFill>
+              </a:defRPr>
             </a:lvl2pPr>
-            <a:lvl3pPr marL="914400" indent="0">
+            <a:lvl3pPr marL="685800" indent="0">
               <a:buNone/>
-              <a:defRPr sz="1600">
+              <a:defRPr sz="1350">
                 <a:solidFill>
                   <a:schemeClr val="tx1">
                     <a:tint val="75000"/>
@@ -7643,9 +7714,9 @@
                 </a:solidFill>
               </a:defRPr>
             </a:lvl3pPr>
-            <a:lvl4pPr marL="1371600" indent="0">
+            <a:lvl4pPr marL="1028700" indent="0">
               <a:buNone/>
-              <a:defRPr sz="1400">
+              <a:defRPr sz="1200">
                 <a:solidFill>
                   <a:schemeClr val="tx1">
                     <a:tint val="75000"/>
@@ -7653,9 +7724,9 @@
                 </a:solidFill>
               </a:defRPr>
             </a:lvl4pPr>
-            <a:lvl5pPr marL="1828800" indent="0">
+            <a:lvl5pPr marL="1371600" indent="0">
               <a:buNone/>
-              <a:defRPr sz="1400">
+              <a:defRPr sz="1200">
                 <a:solidFill>
                   <a:schemeClr val="tx1">
                     <a:tint val="75000"/>
@@ -7663,9 +7734,9 @@
                 </a:solidFill>
               </a:defRPr>
             </a:lvl5pPr>
-            <a:lvl6pPr marL="2286000" indent="0">
+            <a:lvl6pPr marL="1714500" indent="0">
               <a:buNone/>
-              <a:defRPr sz="1400">
+              <a:defRPr sz="1200">
                 <a:solidFill>
                   <a:schemeClr val="tx1">
                     <a:tint val="75000"/>
@@ -7673,9 +7744,9 @@
                 </a:solidFill>
               </a:defRPr>
             </a:lvl6pPr>
-            <a:lvl7pPr marL="2743200" indent="0">
+            <a:lvl7pPr marL="2057400" indent="0">
               <a:buNone/>
-              <a:defRPr sz="1400">
+              <a:defRPr sz="1200">
                 <a:solidFill>
                   <a:schemeClr val="tx1">
                     <a:tint val="75000"/>
@@ -7683,9 +7754,9 @@
                 </a:solidFill>
               </a:defRPr>
             </a:lvl7pPr>
-            <a:lvl8pPr marL="3200400" indent="0">
+            <a:lvl8pPr marL="2400300" indent="0">
               <a:buNone/>
-              <a:defRPr sz="1400">
+              <a:defRPr sz="1200">
                 <a:solidFill>
                   <a:schemeClr val="tx1">
                     <a:tint val="75000"/>
@@ -7693,9 +7764,9 @@
                 </a:solidFill>
               </a:defRPr>
             </a:lvl8pPr>
-            <a:lvl9pPr marL="3657600" indent="0">
+            <a:lvl9pPr marL="2743200" indent="0">
               <a:buNone/>
-              <a:defRPr sz="1400">
+              <a:defRPr sz="1200">
                 <a:solidFill>
                   <a:schemeClr val="tx1">
                     <a:tint val="75000"/>
@@ -7730,7 +7801,7 @@
           <a:p>
             <a:fld id="{8CD81659-45C7-4E81-8384-90E41BDB4D30}" type="datetime1">
               <a:rPr lang="en-US" smtClean="0"/>
-              <a:t>9/6/2016</a:t>
+              <a:t>9/4/17</a:t>
             </a:fld>
             <a:endParaRPr lang="en-US" dirty="0"/>
           </a:p>
@@ -7781,7 +7852,7 @@
     </p:spTree>
     <p:extLst>
       <p:ext uri="{BB962C8B-B14F-4D97-AF65-F5344CB8AC3E}">
-        <p14:creationId xmlns:p14="http://schemas.microsoft.com/office/powerpoint/2010/main" val="2303303306"/>
+        <p14:creationId xmlns:p14="http://schemas.microsoft.com/office/powerpoint/2010/main" val="1451379586"/>
       </p:ext>
     </p:extLst>
   </p:cSld>
@@ -7843,41 +7914,13 @@
         </p:nvSpPr>
         <p:spPr>
           <a:xfrm>
-            <a:off x="457200" y="1600200"/>
-            <a:ext cx="4038600" cy="4525963"/>
+            <a:off x="628650" y="1825625"/>
+            <a:ext cx="3886200" cy="4351338"/>
           </a:xfrm>
         </p:spPr>
         <p:txBody>
           <a:bodyPr/>
-          <a:lstStyle>
-            <a:lvl1pPr>
-              <a:defRPr sz="2800"/>
-            </a:lvl1pPr>
-            <a:lvl2pPr>
-              <a:defRPr sz="2400"/>
-            </a:lvl2pPr>
-            <a:lvl3pPr>
-              <a:defRPr sz="2000"/>
-            </a:lvl3pPr>
-            <a:lvl4pPr>
-              <a:defRPr sz="1800"/>
-            </a:lvl4pPr>
-            <a:lvl5pPr>
-              <a:defRPr sz="1800"/>
-            </a:lvl5pPr>
-            <a:lvl6pPr>
-              <a:defRPr sz="1800"/>
-            </a:lvl6pPr>
-            <a:lvl7pPr>
-              <a:defRPr sz="1800"/>
-            </a:lvl7pPr>
-            <a:lvl8pPr>
-              <a:defRPr sz="1800"/>
-            </a:lvl8pPr>
-            <a:lvl9pPr>
-              <a:defRPr sz="1800"/>
-            </a:lvl9pPr>
-          </a:lstStyle>
+          <a:lstStyle/>
           <a:p>
             <a:pPr lvl="0"/>
             <a:r>
@@ -7928,41 +7971,13 @@
         </p:nvSpPr>
         <p:spPr>
           <a:xfrm>
-            <a:off x="4648200" y="1600200"/>
-            <a:ext cx="4038600" cy="4525963"/>
+            <a:off x="4629150" y="1825625"/>
+            <a:ext cx="3886200" cy="4351338"/>
           </a:xfrm>
         </p:spPr>
         <p:txBody>
           <a:bodyPr/>
-          <a:lstStyle>
-            <a:lvl1pPr>
-              <a:defRPr sz="2800"/>
-            </a:lvl1pPr>
-            <a:lvl2pPr>
-              <a:defRPr sz="2400"/>
-            </a:lvl2pPr>
-            <a:lvl3pPr>
-              <a:defRPr sz="2000"/>
-            </a:lvl3pPr>
-            <a:lvl4pPr>
-              <a:defRPr sz="1800"/>
-            </a:lvl4pPr>
-            <a:lvl5pPr>
-              <a:defRPr sz="1800"/>
-            </a:lvl5pPr>
-            <a:lvl6pPr>
-              <a:defRPr sz="1800"/>
-            </a:lvl6pPr>
-            <a:lvl7pPr>
-              <a:defRPr sz="1800"/>
-            </a:lvl7pPr>
-            <a:lvl8pPr>
-              <a:defRPr sz="1800"/>
-            </a:lvl8pPr>
-            <a:lvl9pPr>
-              <a:defRPr sz="1800"/>
-            </a:lvl9pPr>
-          </a:lstStyle>
+          <a:lstStyle/>
           <a:p>
             <a:pPr lvl="0"/>
             <a:r>
@@ -8018,7 +8033,7 @@
           <a:p>
             <a:fld id="{20E3ECE6-13D9-45FA-B76A-4861C4916C81}" type="datetime1">
               <a:rPr lang="en-US" smtClean="0"/>
-              <a:t>9/6/2016</a:t>
+              <a:t>9/4/17</a:t>
             </a:fld>
             <a:endParaRPr lang="en-US" dirty="0"/>
           </a:p>
@@ -8069,7 +8084,7 @@
     </p:spTree>
     <p:extLst>
       <p:ext uri="{BB962C8B-B14F-4D97-AF65-F5344CB8AC3E}">
-        <p14:creationId xmlns:p14="http://schemas.microsoft.com/office/powerpoint/2010/main" val="2084200159"/>
+        <p14:creationId xmlns:p14="http://schemas.microsoft.com/office/powerpoint/2010/main" val="69955629"/>
       </p:ext>
     </p:extLst>
   </p:cSld>
@@ -8106,14 +8121,15 @@
             <p:ph type="title"/>
           </p:nvPr>
         </p:nvSpPr>
-        <p:spPr/>
+        <p:spPr>
+          <a:xfrm>
+            <a:off x="629841" y="365126"/>
+            <a:ext cx="7886700" cy="1325563"/>
+          </a:xfrm>
+        </p:spPr>
         <p:txBody>
           <a:bodyPr/>
-          <a:lstStyle>
-            <a:lvl1pPr>
-              <a:defRPr/>
-            </a:lvl1pPr>
-          </a:lstStyle>
+          <a:lstStyle/>
           <a:p>
             <a:r>
               <a:rPr lang="en-US" smtClean="0"/>
@@ -8135,8 +8151,8 @@
         </p:nvSpPr>
         <p:spPr>
           <a:xfrm>
-            <a:off x="457200" y="1535113"/>
-            <a:ext cx="4040188" cy="639762"/>
+            <a:off x="629842" y="1681163"/>
+            <a:ext cx="3868340" cy="823912"/>
           </a:xfrm>
         </p:spPr>
         <p:txBody>
@@ -8144,39 +8160,39 @@
           <a:lstStyle>
             <a:lvl1pPr marL="0" indent="0">
               <a:buNone/>
-              <a:defRPr sz="2400" b="1"/>
+              <a:defRPr sz="1800" b="1"/>
             </a:lvl1pPr>
-            <a:lvl2pPr marL="457200" indent="0">
+            <a:lvl2pPr marL="342900" indent="0">
               <a:buNone/>
-              <a:defRPr sz="2000" b="1"/>
+              <a:defRPr sz="1500" b="1"/>
             </a:lvl2pPr>
-            <a:lvl3pPr marL="914400" indent="0">
+            <a:lvl3pPr marL="685800" indent="0">
               <a:buNone/>
-              <a:defRPr sz="1800" b="1"/>
+              <a:defRPr sz="1350" b="1"/>
             </a:lvl3pPr>
-            <a:lvl4pPr marL="1371600" indent="0">
+            <a:lvl4pPr marL="1028700" indent="0">
               <a:buNone/>
-              <a:defRPr sz="1600" b="1"/>
+              <a:defRPr sz="1200" b="1"/>
             </a:lvl4pPr>
-            <a:lvl5pPr marL="1828800" indent="0">
+            <a:lvl5pPr marL="1371600" indent="0">
               <a:buNone/>
-              <a:defRPr sz="1600" b="1"/>
+              <a:defRPr sz="1200" b="1"/>
             </a:lvl5pPr>
-            <a:lvl6pPr marL="2286000" indent="0">
+            <a:lvl6pPr marL="1714500" indent="0">
               <a:buNone/>
-              <a:defRPr sz="1600" b="1"/>
+              <a:defRPr sz="1200" b="1"/>
             </a:lvl6pPr>
-            <a:lvl7pPr marL="2743200" indent="0">
+            <a:lvl7pPr marL="2057400" indent="0">
               <a:buNone/>
-              <a:defRPr sz="1600" b="1"/>
+              <a:defRPr sz="1200" b="1"/>
             </a:lvl7pPr>
-            <a:lvl8pPr marL="3200400" indent="0">
+            <a:lvl8pPr marL="2400300" indent="0">
               <a:buNone/>
-              <a:defRPr sz="1600" b="1"/>
+              <a:defRPr sz="1200" b="1"/>
             </a:lvl8pPr>
-            <a:lvl9pPr marL="3657600" indent="0">
+            <a:lvl9pPr marL="2743200" indent="0">
               <a:buNone/>
-              <a:defRPr sz="1600" b="1"/>
+              <a:defRPr sz="1200" b="1"/>
             </a:lvl9pPr>
           </a:lstStyle>
           <a:p>
@@ -8200,41 +8216,13 @@
         </p:nvSpPr>
         <p:spPr>
           <a:xfrm>
-            <a:off x="457200" y="2174875"/>
-            <a:ext cx="4040188" cy="3951288"/>
+            <a:off x="629842" y="2505075"/>
+            <a:ext cx="3868340" cy="3684588"/>
           </a:xfrm>
         </p:spPr>
         <p:txBody>
           <a:bodyPr/>
-          <a:lstStyle>
-            <a:lvl1pPr>
-              <a:defRPr sz="2400"/>
-            </a:lvl1pPr>
-            <a:lvl2pPr>
-              <a:defRPr sz="2000"/>
-            </a:lvl2pPr>
-            <a:lvl3pPr>
-              <a:defRPr sz="1800"/>
-            </a:lvl3pPr>
-            <a:lvl4pPr>
-              <a:defRPr sz="1600"/>
-            </a:lvl4pPr>
-            <a:lvl5pPr>
-              <a:defRPr sz="1600"/>
-            </a:lvl5pPr>
-            <a:lvl6pPr>
-              <a:defRPr sz="1600"/>
-            </a:lvl6pPr>
-            <a:lvl7pPr>
-              <a:defRPr sz="1600"/>
-            </a:lvl7pPr>
-            <a:lvl8pPr>
-              <a:defRPr sz="1600"/>
-            </a:lvl8pPr>
-            <a:lvl9pPr>
-              <a:defRPr sz="1600"/>
-            </a:lvl9pPr>
-          </a:lstStyle>
+          <a:lstStyle/>
           <a:p>
             <a:pPr lvl="0"/>
             <a:r>
@@ -8285,8 +8273,8 @@
         </p:nvSpPr>
         <p:spPr>
           <a:xfrm>
-            <a:off x="4645025" y="1535113"/>
-            <a:ext cx="4041775" cy="639762"/>
+            <a:off x="4629150" y="1681163"/>
+            <a:ext cx="3887391" cy="823912"/>
           </a:xfrm>
         </p:spPr>
         <p:txBody>
@@ -8294,39 +8282,39 @@
           <a:lstStyle>
             <a:lvl1pPr marL="0" indent="0">
               <a:buNone/>
-              <a:defRPr sz="2400" b="1"/>
+              <a:defRPr sz="1800" b="1"/>
             </a:lvl1pPr>
-            <a:lvl2pPr marL="457200" indent="0">
+            <a:lvl2pPr marL="342900" indent="0">
               <a:buNone/>
-              <a:defRPr sz="2000" b="1"/>
+              <a:defRPr sz="1500" b="1"/>
             </a:lvl2pPr>
-            <a:lvl3pPr marL="914400" indent="0">
+            <a:lvl3pPr marL="685800" indent="0">
               <a:buNone/>
-              <a:defRPr sz="1800" b="1"/>
+              <a:defRPr sz="1350" b="1"/>
             </a:lvl3pPr>
-            <a:lvl4pPr marL="1371600" indent="0">
+            <a:lvl4pPr marL="1028700" indent="0">
               <a:buNone/>
-              <a:defRPr sz="1600" b="1"/>
+              <a:defRPr sz="1200" b="1"/>
             </a:lvl4pPr>
-            <a:lvl5pPr marL="1828800" indent="0">
+            <a:lvl5pPr marL="1371600" indent="0">
               <a:buNone/>
-              <a:defRPr sz="1600" b="1"/>
+              <a:defRPr sz="1200" b="1"/>
             </a:lvl5pPr>
-            <a:lvl6pPr marL="2286000" indent="0">
+            <a:lvl6pPr marL="1714500" indent="0">
               <a:buNone/>
-              <a:defRPr sz="1600" b="1"/>
+              <a:defRPr sz="1200" b="1"/>
             </a:lvl6pPr>
-            <a:lvl7pPr marL="2743200" indent="0">
+            <a:lvl7pPr marL="2057400" indent="0">
               <a:buNone/>
-              <a:defRPr sz="1600" b="1"/>
+              <a:defRPr sz="1200" b="1"/>
             </a:lvl7pPr>
-            <a:lvl8pPr marL="3200400" indent="0">
+            <a:lvl8pPr marL="2400300" indent="0">
               <a:buNone/>
-              <a:defRPr sz="1600" b="1"/>
+              <a:defRPr sz="1200" b="1"/>
             </a:lvl8pPr>
-            <a:lvl9pPr marL="3657600" indent="0">
+            <a:lvl9pPr marL="2743200" indent="0">
               <a:buNone/>
-              <a:defRPr sz="1600" b="1"/>
+              <a:defRPr sz="1200" b="1"/>
             </a:lvl9pPr>
           </a:lstStyle>
           <a:p>
@@ -8350,41 +8338,13 @@
         </p:nvSpPr>
         <p:spPr>
           <a:xfrm>
-            <a:off x="4645025" y="2174875"/>
-            <a:ext cx="4041775" cy="3951288"/>
+            <a:off x="4629150" y="2505075"/>
+            <a:ext cx="3887391" cy="3684588"/>
           </a:xfrm>
         </p:spPr>
         <p:txBody>
           <a:bodyPr/>
-          <a:lstStyle>
-            <a:lvl1pPr>
-              <a:defRPr sz="2400"/>
-            </a:lvl1pPr>
-            <a:lvl2pPr>
-              <a:defRPr sz="2000"/>
-            </a:lvl2pPr>
-            <a:lvl3pPr>
-              <a:defRPr sz="1800"/>
-            </a:lvl3pPr>
-            <a:lvl4pPr>
-              <a:defRPr sz="1600"/>
-            </a:lvl4pPr>
-            <a:lvl5pPr>
-              <a:defRPr sz="1600"/>
-            </a:lvl5pPr>
-            <a:lvl6pPr>
-              <a:defRPr sz="1600"/>
-            </a:lvl6pPr>
-            <a:lvl7pPr>
-              <a:defRPr sz="1600"/>
-            </a:lvl7pPr>
-            <a:lvl8pPr>
-              <a:defRPr sz="1600"/>
-            </a:lvl8pPr>
-            <a:lvl9pPr>
-              <a:defRPr sz="1600"/>
-            </a:lvl9pPr>
-          </a:lstStyle>
+          <a:lstStyle/>
           <a:p>
             <a:pPr lvl="0"/>
             <a:r>
@@ -8440,7 +8400,7 @@
           <a:p>
             <a:fld id="{FAB46115-8EE3-4865-AFF5-E8DE19A36F8C}" type="datetime1">
               <a:rPr lang="en-US" smtClean="0"/>
-              <a:t>9/6/2016</a:t>
+              <a:t>9/4/17</a:t>
             </a:fld>
             <a:endParaRPr lang="en-US" dirty="0"/>
           </a:p>
@@ -8491,7 +8451,7 @@
     </p:spTree>
     <p:extLst>
       <p:ext uri="{BB962C8B-B14F-4D97-AF65-F5344CB8AC3E}">
-        <p14:creationId xmlns:p14="http://schemas.microsoft.com/office/powerpoint/2010/main" val="2387618513"/>
+        <p14:creationId xmlns:p14="http://schemas.microsoft.com/office/powerpoint/2010/main" val="1070701694"/>
       </p:ext>
     </p:extLst>
   </p:cSld>
@@ -8558,7 +8518,7 @@
           <a:p>
             <a:fld id="{3B5D2227-E7B6-4AF5-BFC2-B9342252906F}" type="datetime1">
               <a:rPr lang="en-US" smtClean="0"/>
-              <a:t>9/6/2016</a:t>
+              <a:t>9/4/17</a:t>
             </a:fld>
             <a:endParaRPr lang="en-US" dirty="0"/>
           </a:p>
@@ -8609,7 +8569,7 @@
     </p:spTree>
     <p:extLst>
       <p:ext uri="{BB962C8B-B14F-4D97-AF65-F5344CB8AC3E}">
-        <p14:creationId xmlns:p14="http://schemas.microsoft.com/office/powerpoint/2010/main" val="1112908395"/>
+        <p14:creationId xmlns:p14="http://schemas.microsoft.com/office/powerpoint/2010/main" val="1517892845"/>
       </p:ext>
     </p:extLst>
   </p:cSld>
@@ -8653,7 +8613,7 @@
           <a:p>
             <a:fld id="{5CF2329B-02C1-4995-93E6-9C42725F2618}" type="datetime1">
               <a:rPr lang="en-US" smtClean="0"/>
-              <a:t>9/6/2016</a:t>
+              <a:t>9/4/17</a:t>
             </a:fld>
             <a:endParaRPr lang="en-US" dirty="0"/>
           </a:p>
@@ -8704,7 +8664,7 @@
     </p:spTree>
     <p:extLst>
       <p:ext uri="{BB962C8B-B14F-4D97-AF65-F5344CB8AC3E}">
-        <p14:creationId xmlns:p14="http://schemas.microsoft.com/office/powerpoint/2010/main" val="574666923"/>
+        <p14:creationId xmlns:p14="http://schemas.microsoft.com/office/powerpoint/2010/main" val="1266803202"/>
       </p:ext>
     </p:extLst>
   </p:cSld>
@@ -8743,15 +8703,15 @@
         </p:nvSpPr>
         <p:spPr>
           <a:xfrm>
-            <a:off x="457200" y="273050"/>
-            <a:ext cx="3008313" cy="1162050"/>
+            <a:off x="629841" y="457200"/>
+            <a:ext cx="2949178" cy="1600200"/>
           </a:xfrm>
         </p:spPr>
         <p:txBody>
           <a:bodyPr anchor="b"/>
           <a:lstStyle>
-            <a:lvl1pPr algn="l">
-              <a:defRPr sz="2000" b="1"/>
+            <a:lvl1pPr>
+              <a:defRPr sz="2400"/>
             </a:lvl1pPr>
           </a:lstStyle>
           <a:p>
@@ -8775,39 +8735,39 @@
         </p:nvSpPr>
         <p:spPr>
           <a:xfrm>
-            <a:off x="3575050" y="273050"/>
-            <a:ext cx="5111750" cy="5853113"/>
+            <a:off x="3887391" y="987426"/>
+            <a:ext cx="4629150" cy="4873625"/>
           </a:xfrm>
         </p:spPr>
         <p:txBody>
           <a:bodyPr/>
           <a:lstStyle>
             <a:lvl1pPr>
-              <a:defRPr sz="3200"/>
+              <a:defRPr sz="2400"/>
             </a:lvl1pPr>
             <a:lvl2pPr>
-              <a:defRPr sz="2800"/>
+              <a:defRPr sz="2100"/>
             </a:lvl2pPr>
             <a:lvl3pPr>
-              <a:defRPr sz="2400"/>
+              <a:defRPr sz="1800"/>
             </a:lvl3pPr>
             <a:lvl4pPr>
-              <a:defRPr sz="2000"/>
+              <a:defRPr sz="1500"/>
             </a:lvl4pPr>
             <a:lvl5pPr>
-              <a:defRPr sz="2000"/>
+              <a:defRPr sz="1500"/>
             </a:lvl5pPr>
             <a:lvl6pPr>
-              <a:defRPr sz="2000"/>
+              <a:defRPr sz="1500"/>
             </a:lvl6pPr>
             <a:lvl7pPr>
-              <a:defRPr sz="2000"/>
+              <a:defRPr sz="1500"/>
             </a:lvl7pPr>
             <a:lvl8pPr>
-              <a:defRPr sz="2000"/>
+              <a:defRPr sz="1500"/>
             </a:lvl8pPr>
             <a:lvl9pPr>
-              <a:defRPr sz="2000"/>
+              <a:defRPr sz="1500"/>
             </a:lvl9pPr>
           </a:lstStyle>
           <a:p>
@@ -8860,8 +8820,8 @@
         </p:nvSpPr>
         <p:spPr>
           <a:xfrm>
-            <a:off x="457200" y="1435100"/>
-            <a:ext cx="3008313" cy="4691063"/>
+            <a:off x="629841" y="2057400"/>
+            <a:ext cx="2949178" cy="3811588"/>
           </a:xfrm>
         </p:spPr>
         <p:txBody>
@@ -8869,39 +8829,39 @@
           <a:lstStyle>
             <a:lvl1pPr marL="0" indent="0">
               <a:buNone/>
-              <a:defRPr sz="1400"/>
+              <a:defRPr sz="1200"/>
             </a:lvl1pPr>
-            <a:lvl2pPr marL="457200" indent="0">
+            <a:lvl2pPr marL="342900" indent="0">
               <a:buNone/>
-              <a:defRPr sz="1200"/>
+              <a:defRPr sz="1050"/>
             </a:lvl2pPr>
-            <a:lvl3pPr marL="914400" indent="0">
-              <a:buNone/>
-              <a:defRPr sz="1000"/>
-            </a:lvl3pPr>
-            <a:lvl4pPr marL="1371600" indent="0">
+            <a:lvl3pPr marL="685800" indent="0">
               <a:buNone/>
               <a:defRPr sz="900"/>
+            </a:lvl3pPr>
+            <a:lvl4pPr marL="1028700" indent="0">
+              <a:buNone/>
+              <a:defRPr sz="750"/>
             </a:lvl4pPr>
-            <a:lvl5pPr marL="1828800" indent="0">
+            <a:lvl5pPr marL="1371600" indent="0">
               <a:buNone/>
-              <a:defRPr sz="900"/>
+              <a:defRPr sz="750"/>
             </a:lvl5pPr>
-            <a:lvl6pPr marL="2286000" indent="0">
+            <a:lvl6pPr marL="1714500" indent="0">
               <a:buNone/>
-              <a:defRPr sz="900"/>
+              <a:defRPr sz="750"/>
             </a:lvl6pPr>
-            <a:lvl7pPr marL="2743200" indent="0">
+            <a:lvl7pPr marL="2057400" indent="0">
               <a:buNone/>
-              <a:defRPr sz="900"/>
+              <a:defRPr sz="750"/>
             </a:lvl7pPr>
-            <a:lvl8pPr marL="3200400" indent="0">
+            <a:lvl8pPr marL="2400300" indent="0">
               <a:buNone/>
-              <a:defRPr sz="900"/>
+              <a:defRPr sz="750"/>
             </a:lvl8pPr>
-            <a:lvl9pPr marL="3657600" indent="0">
+            <a:lvl9pPr marL="2743200" indent="0">
               <a:buNone/>
-              <a:defRPr sz="900"/>
+              <a:defRPr sz="750"/>
             </a:lvl9pPr>
           </a:lstStyle>
           <a:p>
@@ -8930,7 +8890,7 @@
           <a:p>
             <a:fld id="{E29518E9-0050-4481-9994-1B1BD657A926}" type="datetime1">
               <a:rPr lang="en-US" smtClean="0"/>
-              <a:t>9/6/2016</a:t>
+              <a:t>9/4/17</a:t>
             </a:fld>
             <a:endParaRPr lang="en-US" dirty="0"/>
           </a:p>
@@ -8981,7 +8941,7 @@
     </p:spTree>
     <p:extLst>
       <p:ext uri="{BB962C8B-B14F-4D97-AF65-F5344CB8AC3E}">
-        <p14:creationId xmlns:p14="http://schemas.microsoft.com/office/powerpoint/2010/main" val="415821311"/>
+        <p14:creationId xmlns:p14="http://schemas.microsoft.com/office/powerpoint/2010/main" val="1008539656"/>
       </p:ext>
     </p:extLst>
   </p:cSld>
@@ -9020,15 +8980,15 @@
         </p:nvSpPr>
         <p:spPr>
           <a:xfrm>
-            <a:off x="1792288" y="4800600"/>
-            <a:ext cx="5486400" cy="566738"/>
+            <a:off x="629841" y="457200"/>
+            <a:ext cx="2949178" cy="1600200"/>
           </a:xfrm>
         </p:spPr>
         <p:txBody>
           <a:bodyPr anchor="b"/>
           <a:lstStyle>
-            <a:lvl1pPr algn="l">
-              <a:defRPr sz="2000" b="1"/>
+            <a:lvl1pPr>
+              <a:defRPr sz="2400"/>
             </a:lvl1pPr>
           </a:lstStyle>
           <a:p>
@@ -9052,8 +9012,8 @@
         </p:nvSpPr>
         <p:spPr>
           <a:xfrm>
-            <a:off x="1792288" y="612775"/>
-            <a:ext cx="5486400" cy="4114800"/>
+            <a:off x="3887391" y="987426"/>
+            <a:ext cx="4629150" cy="4873625"/>
           </a:xfrm>
         </p:spPr>
         <p:txBody>
@@ -9061,43 +9021,43 @@
           <a:lstStyle>
             <a:lvl1pPr marL="0" indent="0">
               <a:buNone/>
-              <a:defRPr sz="3200"/>
+              <a:defRPr sz="2400"/>
             </a:lvl1pPr>
-            <a:lvl2pPr marL="457200" indent="0">
+            <a:lvl2pPr marL="342900" indent="0">
               <a:buNone/>
-              <a:defRPr sz="2800"/>
+              <a:defRPr sz="2100"/>
             </a:lvl2pPr>
-            <a:lvl3pPr marL="914400" indent="0">
+            <a:lvl3pPr marL="685800" indent="0">
               <a:buNone/>
-              <a:defRPr sz="2400"/>
+              <a:defRPr sz="1800"/>
             </a:lvl3pPr>
-            <a:lvl4pPr marL="1371600" indent="0">
+            <a:lvl4pPr marL="1028700" indent="0">
               <a:buNone/>
-              <a:defRPr sz="2000"/>
+              <a:defRPr sz="1500"/>
             </a:lvl4pPr>
-            <a:lvl5pPr marL="1828800" indent="0">
+            <a:lvl5pPr marL="1371600" indent="0">
               <a:buNone/>
-              <a:defRPr sz="2000"/>
+              <a:defRPr sz="1500"/>
             </a:lvl5pPr>
-            <a:lvl6pPr marL="2286000" indent="0">
+            <a:lvl6pPr marL="1714500" indent="0">
               <a:buNone/>
-              <a:defRPr sz="2000"/>
+              <a:defRPr sz="1500"/>
             </a:lvl6pPr>
-            <a:lvl7pPr marL="2743200" indent="0">
+            <a:lvl7pPr marL="2057400" indent="0">
               <a:buNone/>
-              <a:defRPr sz="2000"/>
+              <a:defRPr sz="1500"/>
             </a:lvl7pPr>
-            <a:lvl8pPr marL="3200400" indent="0">
+            <a:lvl8pPr marL="2400300" indent="0">
               <a:buNone/>
-              <a:defRPr sz="2000"/>
+              <a:defRPr sz="1500"/>
             </a:lvl8pPr>
-            <a:lvl9pPr marL="3657600" indent="0">
+            <a:lvl9pPr marL="2743200" indent="0">
               <a:buNone/>
-              <a:defRPr sz="2000"/>
+              <a:defRPr sz="1500"/>
             </a:lvl9pPr>
           </a:lstStyle>
           <a:p>
-            <a:endParaRPr lang="en-US" dirty="0"/>
+            <a:endParaRPr lang="en-US"/>
           </a:p>
         </p:txBody>
       </p:sp>
@@ -9113,8 +9073,8 @@
         </p:nvSpPr>
         <p:spPr>
           <a:xfrm>
-            <a:off x="1792288" y="5367338"/>
-            <a:ext cx="5486400" cy="804862"/>
+            <a:off x="629841" y="2057400"/>
+            <a:ext cx="2949178" cy="3811588"/>
           </a:xfrm>
         </p:spPr>
         <p:txBody>
@@ -9122,39 +9082,39 @@
           <a:lstStyle>
             <a:lvl1pPr marL="0" indent="0">
               <a:buNone/>
-              <a:defRPr sz="1400"/>
+              <a:defRPr sz="1200"/>
             </a:lvl1pPr>
-            <a:lvl2pPr marL="457200" indent="0">
+            <a:lvl2pPr marL="342900" indent="0">
               <a:buNone/>
-              <a:defRPr sz="1200"/>
+              <a:defRPr sz="1050"/>
             </a:lvl2pPr>
-            <a:lvl3pPr marL="914400" indent="0">
-              <a:buNone/>
-              <a:defRPr sz="1000"/>
-            </a:lvl3pPr>
-            <a:lvl4pPr marL="1371600" indent="0">
+            <a:lvl3pPr marL="685800" indent="0">
               <a:buNone/>
               <a:defRPr sz="900"/>
+            </a:lvl3pPr>
+            <a:lvl4pPr marL="1028700" indent="0">
+              <a:buNone/>
+              <a:defRPr sz="750"/>
             </a:lvl4pPr>
-            <a:lvl5pPr marL="1828800" indent="0">
+            <a:lvl5pPr marL="1371600" indent="0">
               <a:buNone/>
-              <a:defRPr sz="900"/>
+              <a:defRPr sz="750"/>
             </a:lvl5pPr>
-            <a:lvl6pPr marL="2286000" indent="0">
+            <a:lvl6pPr marL="1714500" indent="0">
               <a:buNone/>
-              <a:defRPr sz="900"/>
+              <a:defRPr sz="750"/>
             </a:lvl6pPr>
-            <a:lvl7pPr marL="2743200" indent="0">
+            <a:lvl7pPr marL="2057400" indent="0">
               <a:buNone/>
-              <a:defRPr sz="900"/>
+              <a:defRPr sz="750"/>
             </a:lvl7pPr>
-            <a:lvl8pPr marL="3200400" indent="0">
+            <a:lvl8pPr marL="2400300" indent="0">
               <a:buNone/>
-              <a:defRPr sz="900"/>
+              <a:defRPr sz="750"/>
             </a:lvl8pPr>
-            <a:lvl9pPr marL="3657600" indent="0">
+            <a:lvl9pPr marL="2743200" indent="0">
               <a:buNone/>
-              <a:defRPr sz="900"/>
+              <a:defRPr sz="750"/>
             </a:lvl9pPr>
           </a:lstStyle>
           <a:p>
@@ -9183,7 +9143,7 @@
           <a:p>
             <a:fld id="{31F1D827-AFAE-42D2-99D0-15DF6D31AE89}" type="datetime1">
               <a:rPr lang="en-US" smtClean="0"/>
-              <a:t>9/6/2016</a:t>
+              <a:t>9/4/17</a:t>
             </a:fld>
             <a:endParaRPr lang="en-US" dirty="0"/>
           </a:p>
@@ -9234,7 +9194,7 @@
     </p:spTree>
     <p:extLst>
       <p:ext uri="{BB962C8B-B14F-4D97-AF65-F5344CB8AC3E}">
-        <p14:creationId xmlns:p14="http://schemas.microsoft.com/office/powerpoint/2010/main" val="1912160005"/>
+        <p14:creationId xmlns:p14="http://schemas.microsoft.com/office/powerpoint/2010/main" val="437572621"/>
       </p:ext>
     </p:extLst>
   </p:cSld>
@@ -9278,8 +9238,8 @@
         </p:nvSpPr>
         <p:spPr>
           <a:xfrm>
-            <a:off x="457200" y="274638"/>
-            <a:ext cx="8229600" cy="1143000"/>
+            <a:off x="628650" y="365126"/>
+            <a:ext cx="7886700" cy="1325563"/>
           </a:xfrm>
           <a:prstGeom prst="rect">
             <a:avLst/>
@@ -9311,8 +9271,8 @@
         </p:nvSpPr>
         <p:spPr>
           <a:xfrm>
-            <a:off x="457200" y="1600200"/>
-            <a:ext cx="8229600" cy="4525963"/>
+            <a:off x="628650" y="1825625"/>
+            <a:ext cx="7886700" cy="4351338"/>
           </a:xfrm>
           <a:prstGeom prst="rect">
             <a:avLst/>
@@ -9373,8 +9333,8 @@
         </p:nvSpPr>
         <p:spPr>
           <a:xfrm>
-            <a:off x="457200" y="6356350"/>
-            <a:ext cx="2133600" cy="365125"/>
+            <a:off x="628650" y="6356351"/>
+            <a:ext cx="2057400" cy="365125"/>
           </a:xfrm>
           <a:prstGeom prst="rect">
             <a:avLst/>
@@ -9384,7 +9344,7 @@
           <a:bodyPr vert="horz" lIns="91440" tIns="45720" rIns="91440" bIns="45720" rtlCol="0" anchor="ctr"/>
           <a:lstStyle>
             <a:lvl1pPr algn="l">
-              <a:defRPr sz="1200">
+              <a:defRPr sz="900">
                 <a:solidFill>
                   <a:schemeClr val="tx1">
                     <a:tint val="75000"/>
@@ -9396,7 +9356,7 @@
           <a:p>
             <a:fld id="{03F15435-DE0E-46E4-9099-38C66E8EAB5F}" type="datetime1">
               <a:rPr lang="en-US" smtClean="0"/>
-              <a:t>9/6/2016</a:t>
+              <a:t>9/4/17</a:t>
             </a:fld>
             <a:endParaRPr lang="en-US" dirty="0"/>
           </a:p>
@@ -9414,8 +9374,8 @@
         </p:nvSpPr>
         <p:spPr>
           <a:xfrm>
-            <a:off x="3124200" y="6356350"/>
-            <a:ext cx="2895600" cy="365125"/>
+            <a:off x="3028950" y="6356351"/>
+            <a:ext cx="3086100" cy="365125"/>
           </a:xfrm>
           <a:prstGeom prst="rect">
             <a:avLst/>
@@ -9425,7 +9385,7 @@
           <a:bodyPr vert="horz" lIns="91440" tIns="45720" rIns="91440" bIns="45720" rtlCol="0" anchor="ctr"/>
           <a:lstStyle>
             <a:lvl1pPr algn="ctr">
-              <a:defRPr sz="1200">
+              <a:defRPr sz="900">
                 <a:solidFill>
                   <a:schemeClr val="tx1">
                     <a:tint val="75000"/>
@@ -9451,8 +9411,8 @@
         </p:nvSpPr>
         <p:spPr>
           <a:xfrm>
-            <a:off x="6553200" y="6356350"/>
-            <a:ext cx="2133600" cy="365125"/>
+            <a:off x="6457950" y="6356351"/>
+            <a:ext cx="2057400" cy="365125"/>
           </a:xfrm>
           <a:prstGeom prst="rect">
             <a:avLst/>
@@ -9462,7 +9422,7 @@
           <a:bodyPr vert="horz" lIns="91440" tIns="45720" rIns="91440" bIns="45720" rtlCol="0" anchor="ctr"/>
           <a:lstStyle>
             <a:lvl1pPr algn="r">
-              <a:defRPr sz="1200">
+              <a:defRPr sz="900">
                 <a:solidFill>
                   <a:schemeClr val="tx1">
                     <a:tint val="75000"/>
@@ -9483,33 +9443,36 @@
     </p:spTree>
     <p:extLst>
       <p:ext uri="{BB962C8B-B14F-4D97-AF65-F5344CB8AC3E}">
-        <p14:creationId xmlns:p14="http://schemas.microsoft.com/office/powerpoint/2010/main" val="1400673835"/>
+        <p14:creationId xmlns:p14="http://schemas.microsoft.com/office/powerpoint/2010/main" val="544905595"/>
       </p:ext>
     </p:extLst>
   </p:cSld>
   <p:clrMap bg1="lt1" tx1="dk1" bg2="lt2" tx2="dk2" accent1="accent1" accent2="accent2" accent3="accent3" accent4="accent4" accent5="accent5" accent6="accent6" hlink="hlink" folHlink="folHlink"/>
   <p:sldLayoutIdLst>
-    <p:sldLayoutId id="2147483649" r:id="rId1"/>
-    <p:sldLayoutId id="2147483650" r:id="rId2"/>
-    <p:sldLayoutId id="2147483651" r:id="rId3"/>
-    <p:sldLayoutId id="2147483652" r:id="rId4"/>
-    <p:sldLayoutId id="2147483653" r:id="rId5"/>
-    <p:sldLayoutId id="2147483654" r:id="rId6"/>
-    <p:sldLayoutId id="2147483655" r:id="rId7"/>
-    <p:sldLayoutId id="2147483656" r:id="rId8"/>
-    <p:sldLayoutId id="2147483657" r:id="rId9"/>
-    <p:sldLayoutId id="2147483658" r:id="rId10"/>
-    <p:sldLayoutId id="2147483659" r:id="rId11"/>
+    <p:sldLayoutId id="2147483661" r:id="rId1"/>
+    <p:sldLayoutId id="2147483662" r:id="rId2"/>
+    <p:sldLayoutId id="2147483663" r:id="rId3"/>
+    <p:sldLayoutId id="2147483664" r:id="rId4"/>
+    <p:sldLayoutId id="2147483665" r:id="rId5"/>
+    <p:sldLayoutId id="2147483666" r:id="rId6"/>
+    <p:sldLayoutId id="2147483667" r:id="rId7"/>
+    <p:sldLayoutId id="2147483668" r:id="rId8"/>
+    <p:sldLayoutId id="2147483669" r:id="rId9"/>
+    <p:sldLayoutId id="2147483670" r:id="rId10"/>
+    <p:sldLayoutId id="2147483671" r:id="rId11"/>
   </p:sldLayoutIdLst>
   <p:hf hdr="0" ftr="0" dt="0"/>
   <p:txStyles>
     <p:titleStyle>
-      <a:lvl1pPr algn="ctr" defTabSz="914400" rtl="0" eaLnBrk="1" latinLnBrk="0" hangingPunct="1">
+      <a:lvl1pPr algn="l" defTabSz="685800" rtl="0" eaLnBrk="1" latinLnBrk="0" hangingPunct="1">
+        <a:lnSpc>
+          <a:spcPct val="90000"/>
+        </a:lnSpc>
         <a:spcBef>
           <a:spcPct val="0"/>
         </a:spcBef>
         <a:buNone/>
-        <a:defRPr sz="4400" kern="1200">
+        <a:defRPr sz="3300" kern="1200">
           <a:solidFill>
             <a:schemeClr val="tx1"/>
           </a:solidFill>
@@ -9520,13 +9483,16 @@
       </a:lvl1pPr>
     </p:titleStyle>
     <p:bodyStyle>
-      <a:lvl1pPr marL="342900" indent="-342900" algn="l" defTabSz="914400" rtl="0" eaLnBrk="1" latinLnBrk="0" hangingPunct="1">
+      <a:lvl1pPr marL="171450" indent="-171450" algn="l" defTabSz="685800" rtl="0" eaLnBrk="1" latinLnBrk="0" hangingPunct="1">
+        <a:lnSpc>
+          <a:spcPct val="90000"/>
+        </a:lnSpc>
         <a:spcBef>
-          <a:spcPct val="20000"/>
+          <a:spcPts val="750"/>
         </a:spcBef>
-        <a:buFont typeface="Arial" pitchFamily="34" charset="0"/>
+        <a:buFont typeface="Arial"/>
         <a:buChar char="•"/>
-        <a:defRPr sz="3200" kern="1200">
+        <a:defRPr sz="2100" kern="1200">
           <a:solidFill>
             <a:schemeClr val="tx1"/>
           </a:solidFill>
@@ -9535,13 +9501,16 @@
           <a:cs typeface="+mn-cs"/>
         </a:defRPr>
       </a:lvl1pPr>
-      <a:lvl2pPr marL="742950" indent="-285750" algn="l" defTabSz="914400" rtl="0" eaLnBrk="1" latinLnBrk="0" hangingPunct="1">
+      <a:lvl2pPr marL="514350" indent="-171450" algn="l" defTabSz="685800" rtl="0" eaLnBrk="1" latinLnBrk="0" hangingPunct="1">
+        <a:lnSpc>
+          <a:spcPct val="90000"/>
+        </a:lnSpc>
         <a:spcBef>
-          <a:spcPct val="20000"/>
+          <a:spcPts val="375"/>
         </a:spcBef>
-        <a:buFont typeface="Arial" pitchFamily="34" charset="0"/>
-        <a:buChar char="–"/>
-        <a:defRPr sz="2800" kern="1200">
+        <a:buFont typeface="Arial"/>
+        <a:buChar char="•"/>
+        <a:defRPr sz="1800" kern="1200">
           <a:solidFill>
             <a:schemeClr val="tx1"/>
           </a:solidFill>
@@ -9550,13 +9519,16 @@
           <a:cs typeface="+mn-cs"/>
         </a:defRPr>
       </a:lvl2pPr>
-      <a:lvl3pPr marL="1143000" indent="-228600" algn="l" defTabSz="914400" rtl="0" eaLnBrk="1" latinLnBrk="0" hangingPunct="1">
+      <a:lvl3pPr marL="857250" indent="-171450" algn="l" defTabSz="685800" rtl="0" eaLnBrk="1" latinLnBrk="0" hangingPunct="1">
+        <a:lnSpc>
+          <a:spcPct val="90000"/>
+        </a:lnSpc>
         <a:spcBef>
-          <a:spcPct val="20000"/>
+          <a:spcPts val="375"/>
         </a:spcBef>
-        <a:buFont typeface="Arial" pitchFamily="34" charset="0"/>
+        <a:buFont typeface="Arial"/>
         <a:buChar char="•"/>
-        <a:defRPr sz="2400" kern="1200">
+        <a:defRPr sz="1500" kern="1200">
           <a:solidFill>
             <a:schemeClr val="tx1"/>
           </a:solidFill>
@@ -9565,13 +9537,16 @@
           <a:cs typeface="+mn-cs"/>
         </a:defRPr>
       </a:lvl3pPr>
-      <a:lvl4pPr marL="1600200" indent="-228600" algn="l" defTabSz="914400" rtl="0" eaLnBrk="1" latinLnBrk="0" hangingPunct="1">
+      <a:lvl4pPr marL="1200150" indent="-171450" algn="l" defTabSz="685800" rtl="0" eaLnBrk="1" latinLnBrk="0" hangingPunct="1">
+        <a:lnSpc>
+          <a:spcPct val="90000"/>
+        </a:lnSpc>
         <a:spcBef>
-          <a:spcPct val="20000"/>
+          <a:spcPts val="375"/>
         </a:spcBef>
-        <a:buFont typeface="Arial" pitchFamily="34" charset="0"/>
-        <a:buChar char="–"/>
-        <a:defRPr sz="2000" kern="1200">
+        <a:buFont typeface="Arial"/>
+        <a:buChar char="•"/>
+        <a:defRPr sz="1350" kern="1200">
           <a:solidFill>
             <a:schemeClr val="tx1"/>
           </a:solidFill>
@@ -9580,13 +9555,16 @@
           <a:cs typeface="+mn-cs"/>
         </a:defRPr>
       </a:lvl4pPr>
-      <a:lvl5pPr marL="2057400" indent="-228600" algn="l" defTabSz="914400" rtl="0" eaLnBrk="1" latinLnBrk="0" hangingPunct="1">
+      <a:lvl5pPr marL="1543050" indent="-171450" algn="l" defTabSz="685800" rtl="0" eaLnBrk="1" latinLnBrk="0" hangingPunct="1">
+        <a:lnSpc>
+          <a:spcPct val="90000"/>
+        </a:lnSpc>
         <a:spcBef>
-          <a:spcPct val="20000"/>
+          <a:spcPts val="375"/>
         </a:spcBef>
-        <a:buFont typeface="Arial" pitchFamily="34" charset="0"/>
-        <a:buChar char="»"/>
-        <a:defRPr sz="2000" kern="1200">
+        <a:buFont typeface="Arial"/>
+        <a:buChar char="•"/>
+        <a:defRPr sz="1350" kern="1200">
           <a:solidFill>
             <a:schemeClr val="tx1"/>
           </a:solidFill>
@@ -9595,13 +9573,16 @@
           <a:cs typeface="+mn-cs"/>
         </a:defRPr>
       </a:lvl5pPr>
-      <a:lvl6pPr marL="2514600" indent="-228600" algn="l" defTabSz="914400" rtl="0" eaLnBrk="1" latinLnBrk="0" hangingPunct="1">
+      <a:lvl6pPr marL="1885950" indent="-171450" algn="l" defTabSz="685800" rtl="0" eaLnBrk="1" latinLnBrk="0" hangingPunct="1">
+        <a:lnSpc>
+          <a:spcPct val="90000"/>
+        </a:lnSpc>
         <a:spcBef>
-          <a:spcPct val="20000"/>
+          <a:spcPts val="375"/>
         </a:spcBef>
-        <a:buFont typeface="Arial" pitchFamily="34" charset="0"/>
+        <a:buFont typeface="Arial"/>
         <a:buChar char="•"/>
-        <a:defRPr sz="2000" kern="1200">
+        <a:defRPr sz="1350" kern="1200">
           <a:solidFill>
             <a:schemeClr val="tx1"/>
           </a:solidFill>
@@ -9610,13 +9591,16 @@
           <a:cs typeface="+mn-cs"/>
         </a:defRPr>
       </a:lvl6pPr>
-      <a:lvl7pPr marL="2971800" indent="-228600" algn="l" defTabSz="914400" rtl="0" eaLnBrk="1" latinLnBrk="0" hangingPunct="1">
+      <a:lvl7pPr marL="2228850" indent="-171450" algn="l" defTabSz="685800" rtl="0" eaLnBrk="1" latinLnBrk="0" hangingPunct="1">
+        <a:lnSpc>
+          <a:spcPct val="90000"/>
+        </a:lnSpc>
         <a:spcBef>
-          <a:spcPct val="20000"/>
+          <a:spcPts val="375"/>
         </a:spcBef>
-        <a:buFont typeface="Arial" pitchFamily="34" charset="0"/>
+        <a:buFont typeface="Arial"/>
         <a:buChar char="•"/>
-        <a:defRPr sz="2000" kern="1200">
+        <a:defRPr sz="1350" kern="1200">
           <a:solidFill>
             <a:schemeClr val="tx1"/>
           </a:solidFill>
@@ -9625,13 +9609,16 @@
           <a:cs typeface="+mn-cs"/>
         </a:defRPr>
       </a:lvl7pPr>
-      <a:lvl8pPr marL="3429000" indent="-228600" algn="l" defTabSz="914400" rtl="0" eaLnBrk="1" latinLnBrk="0" hangingPunct="1">
+      <a:lvl8pPr marL="2571750" indent="-171450" algn="l" defTabSz="685800" rtl="0" eaLnBrk="1" latinLnBrk="0" hangingPunct="1">
+        <a:lnSpc>
+          <a:spcPct val="90000"/>
+        </a:lnSpc>
         <a:spcBef>
-          <a:spcPct val="20000"/>
+          <a:spcPts val="375"/>
         </a:spcBef>
-        <a:buFont typeface="Arial" pitchFamily="34" charset="0"/>
+        <a:buFont typeface="Arial"/>
         <a:buChar char="•"/>
-        <a:defRPr sz="2000" kern="1200">
+        <a:defRPr sz="1350" kern="1200">
           <a:solidFill>
             <a:schemeClr val="tx1"/>
           </a:solidFill>
@@ -9640,13 +9627,16 @@
           <a:cs typeface="+mn-cs"/>
         </a:defRPr>
       </a:lvl8pPr>
-      <a:lvl9pPr marL="3886200" indent="-228600" algn="l" defTabSz="914400" rtl="0" eaLnBrk="1" latinLnBrk="0" hangingPunct="1">
+      <a:lvl9pPr marL="2914650" indent="-171450" algn="l" defTabSz="685800" rtl="0" eaLnBrk="1" latinLnBrk="0" hangingPunct="1">
+        <a:lnSpc>
+          <a:spcPct val="90000"/>
+        </a:lnSpc>
         <a:spcBef>
-          <a:spcPct val="20000"/>
+          <a:spcPts val="375"/>
         </a:spcBef>
-        <a:buFont typeface="Arial" pitchFamily="34" charset="0"/>
+        <a:buFont typeface="Arial"/>
         <a:buChar char="•"/>
-        <a:defRPr sz="2000" kern="1200">
+        <a:defRPr sz="1350" kern="1200">
           <a:solidFill>
             <a:schemeClr val="tx1"/>
           </a:solidFill>
@@ -9660,8 +9650,8 @@
       <a:defPPr>
         <a:defRPr lang="en-US"/>
       </a:defPPr>
-      <a:lvl1pPr marL="0" algn="l" defTabSz="914400" rtl="0" eaLnBrk="1" latinLnBrk="0" hangingPunct="1">
-        <a:defRPr sz="1800" kern="1200">
+      <a:lvl1pPr marL="0" algn="l" defTabSz="685800" rtl="0" eaLnBrk="1" latinLnBrk="0" hangingPunct="1">
+        <a:defRPr sz="1350" kern="1200">
           <a:solidFill>
             <a:schemeClr val="tx1"/>
           </a:solidFill>
@@ -9670,8 +9660,8 @@
           <a:cs typeface="+mn-cs"/>
         </a:defRPr>
       </a:lvl1pPr>
-      <a:lvl2pPr marL="457200" algn="l" defTabSz="914400" rtl="0" eaLnBrk="1" latinLnBrk="0" hangingPunct="1">
-        <a:defRPr sz="1800" kern="1200">
+      <a:lvl2pPr marL="342900" algn="l" defTabSz="685800" rtl="0" eaLnBrk="1" latinLnBrk="0" hangingPunct="1">
+        <a:defRPr sz="1350" kern="1200">
           <a:solidFill>
             <a:schemeClr val="tx1"/>
           </a:solidFill>
@@ -9680,8 +9670,8 @@
           <a:cs typeface="+mn-cs"/>
         </a:defRPr>
       </a:lvl2pPr>
-      <a:lvl3pPr marL="914400" algn="l" defTabSz="914400" rtl="0" eaLnBrk="1" latinLnBrk="0" hangingPunct="1">
-        <a:defRPr sz="1800" kern="1200">
+      <a:lvl3pPr marL="685800" algn="l" defTabSz="685800" rtl="0" eaLnBrk="1" latinLnBrk="0" hangingPunct="1">
+        <a:defRPr sz="1350" kern="1200">
           <a:solidFill>
             <a:schemeClr val="tx1"/>
           </a:solidFill>
@@ -9690,8 +9680,8 @@
           <a:cs typeface="+mn-cs"/>
         </a:defRPr>
       </a:lvl3pPr>
-      <a:lvl4pPr marL="1371600" algn="l" defTabSz="914400" rtl="0" eaLnBrk="1" latinLnBrk="0" hangingPunct="1">
-        <a:defRPr sz="1800" kern="1200">
+      <a:lvl4pPr marL="1028700" algn="l" defTabSz="685800" rtl="0" eaLnBrk="1" latinLnBrk="0" hangingPunct="1">
+        <a:defRPr sz="1350" kern="1200">
           <a:solidFill>
             <a:schemeClr val="tx1"/>
           </a:solidFill>
@@ -9700,8 +9690,8 @@
           <a:cs typeface="+mn-cs"/>
         </a:defRPr>
       </a:lvl4pPr>
-      <a:lvl5pPr marL="1828800" algn="l" defTabSz="914400" rtl="0" eaLnBrk="1" latinLnBrk="0" hangingPunct="1">
-        <a:defRPr sz="1800" kern="1200">
+      <a:lvl5pPr marL="1371600" algn="l" defTabSz="685800" rtl="0" eaLnBrk="1" latinLnBrk="0" hangingPunct="1">
+        <a:defRPr sz="1350" kern="1200">
           <a:solidFill>
             <a:schemeClr val="tx1"/>
           </a:solidFill>
@@ -9710,8 +9700,8 @@
           <a:cs typeface="+mn-cs"/>
         </a:defRPr>
       </a:lvl5pPr>
-      <a:lvl6pPr marL="2286000" algn="l" defTabSz="914400" rtl="0" eaLnBrk="1" latinLnBrk="0" hangingPunct="1">
-        <a:defRPr sz="1800" kern="1200">
+      <a:lvl6pPr marL="1714500" algn="l" defTabSz="685800" rtl="0" eaLnBrk="1" latinLnBrk="0" hangingPunct="1">
+        <a:defRPr sz="1350" kern="1200">
           <a:solidFill>
             <a:schemeClr val="tx1"/>
           </a:solidFill>
@@ -9720,8 +9710,8 @@
           <a:cs typeface="+mn-cs"/>
         </a:defRPr>
       </a:lvl6pPr>
-      <a:lvl7pPr marL="2743200" algn="l" defTabSz="914400" rtl="0" eaLnBrk="1" latinLnBrk="0" hangingPunct="1">
-        <a:defRPr sz="1800" kern="1200">
+      <a:lvl7pPr marL="2057400" algn="l" defTabSz="685800" rtl="0" eaLnBrk="1" latinLnBrk="0" hangingPunct="1">
+        <a:defRPr sz="1350" kern="1200">
           <a:solidFill>
             <a:schemeClr val="tx1"/>
           </a:solidFill>
@@ -9730,8 +9720,8 @@
           <a:cs typeface="+mn-cs"/>
         </a:defRPr>
       </a:lvl7pPr>
-      <a:lvl8pPr marL="3200400" algn="l" defTabSz="914400" rtl="0" eaLnBrk="1" latinLnBrk="0" hangingPunct="1">
-        <a:defRPr sz="1800" kern="1200">
+      <a:lvl8pPr marL="2400300" algn="l" defTabSz="685800" rtl="0" eaLnBrk="1" latinLnBrk="0" hangingPunct="1">
+        <a:defRPr sz="1350" kern="1200">
           <a:solidFill>
             <a:schemeClr val="tx1"/>
           </a:solidFill>
@@ -9740,8 +9730,8 @@
           <a:cs typeface="+mn-cs"/>
         </a:defRPr>
       </a:lvl8pPr>
-      <a:lvl9pPr marL="3657600" algn="l" defTabSz="914400" rtl="0" eaLnBrk="1" latinLnBrk="0" hangingPunct="1">
-        <a:defRPr sz="1800" kern="1200">
+      <a:lvl9pPr marL="2743200" algn="l" defTabSz="685800" rtl="0" eaLnBrk="1" latinLnBrk="0" hangingPunct="1">
+        <a:defRPr sz="1350" kern="1200">
           <a:solidFill>
             <a:schemeClr val="tx1"/>
           </a:solidFill>
@@ -10836,7 +10826,7 @@
         <p:spPr/>
         <p:txBody>
           <a:bodyPr>
-            <a:normAutofit fontScale="90000"/>
+            <a:normAutofit/>
           </a:bodyPr>
           <a:lstStyle/>
           <a:p>
@@ -11044,16 +11034,15 @@
           <p:cNvPicPr/>
           <p:nvPr/>
         </p:nvPicPr>
-        <p:blipFill>
+        <p:blipFill rotWithShape="1">
           <a:blip r:embed="rId3"/>
-          <a:stretch>
-            <a:fillRect/>
-          </a:stretch>
+          <a:srcRect r="20274"/>
+          <a:stretch/>
         </p:blipFill>
         <p:spPr>
           <a:xfrm>
-            <a:off x="1600200" y="4876800"/>
-            <a:ext cx="5943600" cy="1355725"/>
+            <a:off x="143359" y="4775200"/>
+            <a:ext cx="4738607" cy="1355725"/>
           </a:xfrm>
           <a:prstGeom prst="rect">
             <a:avLst/>
@@ -11068,7 +11057,7 @@
         </p:nvSpPr>
         <p:spPr>
           <a:xfrm>
-            <a:off x="3640078" y="6232525"/>
+            <a:off x="1470315" y="6117184"/>
             <a:ext cx="1863844" cy="307777"/>
           </a:xfrm>
           <a:prstGeom prst="rect">
@@ -11085,6 +11074,70 @@
             <a:r>
               <a:rPr lang="en-US" sz="1400" dirty="0" smtClean="0"/>
               <a:t>Example (on Windows)</a:t>
+            </a:r>
+            <a:endParaRPr lang="en-US" sz="1400" dirty="0"/>
+          </a:p>
+        </p:txBody>
+      </p:sp>
+      <p:pic>
+        <p:nvPicPr>
+          <p:cNvPr id="4" name="Picture 3"/>
+          <p:cNvPicPr>
+            <a:picLocks noChangeAspect="1"/>
+          </p:cNvPicPr>
+          <p:nvPr/>
+        </p:nvPicPr>
+        <p:blipFill>
+          <a:blip r:embed="rId4">
+            <a:extLst>
+              <a:ext uri="{28A0092B-C50C-407E-A947-70E740481C1C}">
+                <a14:useLocalDpi xmlns:a14="http://schemas.microsoft.com/office/drawing/2010/main" val="0"/>
+              </a:ext>
+            </a:extLst>
+          </a:blip>
+          <a:stretch>
+            <a:fillRect/>
+          </a:stretch>
+        </p:blipFill>
+        <p:spPr>
+          <a:xfrm>
+            <a:off x="4652662" y="4368873"/>
+            <a:ext cx="4091993" cy="1808090"/>
+          </a:xfrm>
+          <a:prstGeom prst="rect">
+            <a:avLst/>
+          </a:prstGeom>
+        </p:spPr>
+      </p:pic>
+      <p:sp>
+        <p:nvSpPr>
+          <p:cNvPr id="11" name="TextBox 10"/>
+          <p:cNvSpPr txBox="1"/>
+          <p:nvPr/>
+        </p:nvSpPr>
+        <p:spPr>
+          <a:xfrm>
+            <a:off x="5949895" y="6176048"/>
+            <a:ext cx="1497526" cy="307777"/>
+          </a:xfrm>
+          <a:prstGeom prst="rect">
+            <a:avLst/>
+          </a:prstGeom>
+          <a:noFill/>
+        </p:spPr>
+        <p:txBody>
+          <a:bodyPr wrap="none" rtlCol="0">
+            <a:spAutoFit/>
+          </a:bodyPr>
+          <a:lstStyle/>
+          <a:p>
+            <a:r>
+              <a:rPr lang="en-US" sz="1400" dirty="0" smtClean="0"/>
+              <a:t>Example (on </a:t>
+            </a:r>
+            <a:r>
+              <a:rPr lang="en-US" sz="1400" dirty="0" smtClean="0"/>
+              <a:t>Mac)</a:t>
             </a:r>
             <a:endParaRPr lang="en-US" sz="1400" dirty="0"/>
           </a:p>
@@ -11103,7 +11156,120 @@
   <p:timing>
     <p:tnLst>
       <p:par>
-        <p:cTn id="1" dur="indefinite" restart="never" nodeType="tmRoot"/>
+        <p:cTn id="1" dur="indefinite" restart="never" nodeType="tmRoot">
+          <p:childTnLst>
+            <p:seq concurrent="1" nextAc="seek">
+              <p:cTn id="2" dur="indefinite" nodeType="mainSeq">
+                <p:childTnLst>
+                  <p:par>
+                    <p:cTn id="3" fill="hold">
+                      <p:stCondLst>
+                        <p:cond delay="indefinite"/>
+                      </p:stCondLst>
+                      <p:childTnLst>
+                        <p:par>
+                          <p:cTn id="4" fill="hold">
+                            <p:stCondLst>
+                              <p:cond delay="0"/>
+                            </p:stCondLst>
+                            <p:childTnLst>
+                              <p:par>
+                                <p:cTn id="5" presetID="1" presetClass="entr" presetSubtype="0" fill="hold" nodeType="clickEffect">
+                                  <p:stCondLst>
+                                    <p:cond delay="0"/>
+                                  </p:stCondLst>
+                                  <p:childTnLst>
+                                    <p:set>
+                                      <p:cBhvr>
+                                        <p:cTn id="6" dur="1" fill="hold">
+                                          <p:stCondLst>
+                                            <p:cond delay="0"/>
+                                          </p:stCondLst>
+                                        </p:cTn>
+                                        <p:tgtEl>
+                                          <p:spTgt spid="9"/>
+                                        </p:tgtEl>
+                                        <p:attrNameLst>
+                                          <p:attrName>style.visibility</p:attrName>
+                                        </p:attrNameLst>
+                                      </p:cBhvr>
+                                      <p:to>
+                                        <p:strVal val="visible"/>
+                                      </p:to>
+                                    </p:set>
+                                  </p:childTnLst>
+                                </p:cTn>
+                              </p:par>
+                            </p:childTnLst>
+                          </p:cTn>
+                        </p:par>
+                      </p:childTnLst>
+                    </p:cTn>
+                  </p:par>
+                  <p:par>
+                    <p:cTn id="7" fill="hold">
+                      <p:stCondLst>
+                        <p:cond delay="indefinite"/>
+                      </p:stCondLst>
+                      <p:childTnLst>
+                        <p:par>
+                          <p:cTn id="8" fill="hold">
+                            <p:stCondLst>
+                              <p:cond delay="0"/>
+                            </p:stCondLst>
+                            <p:childTnLst>
+                              <p:par>
+                                <p:cTn id="9" presetID="1" presetClass="entr" presetSubtype="0" fill="hold" nodeType="clickEffect">
+                                  <p:stCondLst>
+                                    <p:cond delay="0"/>
+                                  </p:stCondLst>
+                                  <p:childTnLst>
+                                    <p:set>
+                                      <p:cBhvr>
+                                        <p:cTn id="10" dur="1" fill="hold">
+                                          <p:stCondLst>
+                                            <p:cond delay="0"/>
+                                          </p:stCondLst>
+                                        </p:cTn>
+                                        <p:tgtEl>
+                                          <p:spTgt spid="4"/>
+                                        </p:tgtEl>
+                                        <p:attrNameLst>
+                                          <p:attrName>style.visibility</p:attrName>
+                                        </p:attrNameLst>
+                                      </p:cBhvr>
+                                      <p:to>
+                                        <p:strVal val="visible"/>
+                                      </p:to>
+                                    </p:set>
+                                  </p:childTnLst>
+                                </p:cTn>
+                              </p:par>
+                            </p:childTnLst>
+                          </p:cTn>
+                        </p:par>
+                      </p:childTnLst>
+                    </p:cTn>
+                  </p:par>
+                </p:childTnLst>
+              </p:cTn>
+              <p:prevCondLst>
+                <p:cond evt="onPrev" delay="0">
+                  <p:tgtEl>
+                    <p:sldTgt/>
+                  </p:tgtEl>
+                </p:cond>
+              </p:prevCondLst>
+              <p:nextCondLst>
+                <p:cond evt="onNext" delay="0">
+                  <p:tgtEl>
+                    <p:sldTgt/>
+                  </p:tgtEl>
+                </p:cond>
+              </p:nextCondLst>
+            </p:seq>
+          </p:childTnLst>
+        </p:cTn>
       </p:par>
     </p:tnLst>
   </p:timing>
@@ -11191,7 +11357,7 @@
         <p:spPr/>
         <p:txBody>
           <a:bodyPr>
-            <a:normAutofit fontScale="90000"/>
+            <a:normAutofit/>
           </a:bodyPr>
           <a:lstStyle/>
           <a:p>
@@ -11508,7 +11674,7 @@
         <p:spPr/>
         <p:txBody>
           <a:bodyPr>
-            <a:normAutofit fontScale="90000"/>
+            <a:normAutofit/>
           </a:bodyPr>
           <a:lstStyle/>
           <a:p>
@@ -11891,6 +12057,29 @@
           </a:p>
         </p:txBody>
       </p:sp>
+      <p:sp>
+        <p:nvSpPr>
+          <p:cNvPr id="7" name="Slide Number Placeholder 6"/>
+          <p:cNvSpPr>
+            <a:spLocks noGrp="1"/>
+          </p:cNvSpPr>
+          <p:nvPr>
+            <p:ph type="sldNum" sz="quarter" idx="12"/>
+          </p:nvPr>
+        </p:nvSpPr>
+        <p:spPr/>
+        <p:txBody>
+          <a:bodyPr/>
+          <a:lstStyle/>
+          <a:p>
+            <a:fld id="{125D8EBD-3626-492B-BEC7-FEAF43DF08E7}" type="slidenum">
+              <a:rPr lang="en-US" smtClean="0"/>
+              <a:t>17</a:t>
+            </a:fld>
+            <a:endParaRPr lang="en-US" dirty="0"/>
+          </a:p>
+        </p:txBody>
+      </p:sp>
       <p:pic>
         <p:nvPicPr>
           <p:cNvPr id="5" name="Picture 4"/>
@@ -11951,29 +12140,6 @@
           </a:prstGeom>
         </p:spPr>
       </p:pic>
-      <p:sp>
-        <p:nvSpPr>
-          <p:cNvPr id="7" name="Slide Number Placeholder 6"/>
-          <p:cNvSpPr>
-            <a:spLocks noGrp="1"/>
-          </p:cNvSpPr>
-          <p:nvPr>
-            <p:ph type="sldNum" sz="quarter" idx="12"/>
-          </p:nvPr>
-        </p:nvSpPr>
-        <p:spPr/>
-        <p:txBody>
-          <a:bodyPr/>
-          <a:lstStyle/>
-          <a:p>
-            <a:fld id="{125D8EBD-3626-492B-BEC7-FEAF43DF08E7}" type="slidenum">
-              <a:rPr lang="en-US" smtClean="0"/>
-              <a:t>17</a:t>
-            </a:fld>
-            <a:endParaRPr lang="en-US" dirty="0"/>
-          </a:p>
-        </p:txBody>
-      </p:sp>
     </p:spTree>
     <p:extLst>
       <p:ext uri="{BB962C8B-B14F-4D97-AF65-F5344CB8AC3E}">
@@ -12084,21 +12250,16 @@
               <a:t>ls</a:t>
             </a:r>
             <a:r>
-              <a:rPr lang="en-US" sz="2400" dirty="0" smtClean="0"/>
-              <a:t>/</a:t>
-            </a:r>
-            <a:r>
-              <a:rPr lang="en-US" sz="2400" dirty="0" err="1" smtClean="0">
-                <a:latin typeface="Courier New" panose="02070309020205020404" pitchFamily="49" charset="0"/>
-                <a:cs typeface="Courier New" panose="02070309020205020404" pitchFamily="49" charset="0"/>
-              </a:rPr>
-              <a:t>dir</a:t>
-            </a:r>
-            <a:r>
               <a:rPr lang="en-US" sz="2400" dirty="0" smtClean="0">
                 <a:cs typeface="Courier New" panose="02070309020205020404" pitchFamily="49" charset="0"/>
               </a:rPr>
-              <a:t>, and </a:t>
+              <a:t>, </a:t>
+            </a:r>
+            <a:r>
+              <a:rPr lang="en-US" sz="2400" dirty="0" smtClean="0">
+                <a:cs typeface="Courier New" panose="02070309020205020404" pitchFamily="49" charset="0"/>
+              </a:rPr>
+              <a:t>and </a:t>
             </a:r>
             <a:r>
               <a:rPr lang="en-US" sz="2400" dirty="0" err="1" smtClean="0">
@@ -12155,6 +12316,29 @@
             <a:endParaRPr lang="en-US" sz="2400" dirty="0" smtClean="0">
               <a:cs typeface="Courier New" pitchFamily="49" charset="0"/>
             </a:endParaRPr>
+          </a:p>
+        </p:txBody>
+      </p:sp>
+      <p:sp>
+        <p:nvSpPr>
+          <p:cNvPr id="7" name="Slide Number Placeholder 6"/>
+          <p:cNvSpPr>
+            <a:spLocks noGrp="1"/>
+          </p:cNvSpPr>
+          <p:nvPr>
+            <p:ph type="sldNum" sz="quarter" idx="12"/>
+          </p:nvPr>
+        </p:nvSpPr>
+        <p:spPr/>
+        <p:txBody>
+          <a:bodyPr/>
+          <a:lstStyle/>
+          <a:p>
+            <a:fld id="{125D8EBD-3626-492B-BEC7-FEAF43DF08E7}" type="slidenum">
+              <a:rPr lang="en-US" smtClean="0"/>
+              <a:t>18</a:t>
+            </a:fld>
+            <a:endParaRPr lang="en-US" dirty="0"/>
           </a:p>
         </p:txBody>
       </p:sp>
@@ -12188,29 +12372,6 @@
           </a:prstGeom>
         </p:spPr>
       </p:pic>
-      <p:sp>
-        <p:nvSpPr>
-          <p:cNvPr id="7" name="Slide Number Placeholder 6"/>
-          <p:cNvSpPr>
-            <a:spLocks noGrp="1"/>
-          </p:cNvSpPr>
-          <p:nvPr>
-            <p:ph type="sldNum" sz="quarter" idx="12"/>
-          </p:nvPr>
-        </p:nvSpPr>
-        <p:spPr/>
-        <p:txBody>
-          <a:bodyPr/>
-          <a:lstStyle/>
-          <a:p>
-            <a:fld id="{125D8EBD-3626-492B-BEC7-FEAF43DF08E7}" type="slidenum">
-              <a:rPr lang="en-US" smtClean="0"/>
-              <a:t>18</a:t>
-            </a:fld>
-            <a:endParaRPr lang="en-US" dirty="0"/>
-          </a:p>
-        </p:txBody>
-      </p:sp>
     </p:spTree>
     <p:extLst>
       <p:ext uri="{BB962C8B-B14F-4D97-AF65-F5344CB8AC3E}">
@@ -12409,7 +12570,7 @@
           <a:p>
             <a:r>
               <a:rPr lang="en-US" dirty="0" smtClean="0"/>
-              <a:t>Course philosophy</a:t>
+              <a:t>Goal</a:t>
             </a:r>
             <a:endParaRPr lang="en-US" dirty="0"/>
           </a:p>
@@ -12427,7 +12588,7 @@
         </p:nvSpPr>
         <p:spPr>
           <a:xfrm>
-            <a:off x="457200" y="1981200"/>
+            <a:off x="457200" y="1814512"/>
             <a:ext cx="8229600" cy="4144963"/>
           </a:xfrm>
         </p:spPr>
@@ -12435,36 +12596,19 @@
           <a:bodyPr/>
           <a:lstStyle/>
           <a:p>
-            <a:pPr>
+            <a:pPr marL="0" indent="0">
               <a:spcAft>
                 <a:spcPts val="1800"/>
               </a:spcAft>
+              <a:buNone/>
             </a:pPr>
             <a:r>
-              <a:rPr lang="en-US" dirty="0" smtClean="0"/>
-              <a:t>The lecture is the least important part.</a:t>
-            </a:r>
-          </a:p>
-          <a:p>
-            <a:pPr>
-              <a:spcAft>
-                <a:spcPts val="1800"/>
-              </a:spcAft>
-            </a:pPr>
-            <a:r>
-              <a:rPr lang="en-US" dirty="0" smtClean="0"/>
-              <a:t>I can't teach you everything, so I will teach you a few things very well.</a:t>
-            </a:r>
-          </a:p>
-          <a:p>
-            <a:pPr>
-              <a:spcAft>
-                <a:spcPts val="1800"/>
-              </a:spcAft>
-            </a:pPr>
-            <a:r>
-              <a:rPr lang="en-US" dirty="0" smtClean="0"/>
-              <a:t>Course goal: get you comfortable enough with Python basics that you can easily learn more on your own when the course is done.</a:t>
+              <a:rPr lang="en-US" sz="3600" dirty="0"/>
+              <a:t>G</a:t>
+            </a:r>
+            <a:r>
+              <a:rPr lang="en-US" sz="3600" dirty="0" smtClean="0"/>
+              <a:t>et you comfortable enough with Python basics that you can easily learn more on your own when the course is done.</a:t>
             </a:r>
           </a:p>
           <a:p>
@@ -12500,6 +12644,30 @@
           </a:p>
         </p:txBody>
       </p:sp>
+      <p:pic>
+        <p:nvPicPr>
+          <p:cNvPr id="5" name="Picture 4"/>
+          <p:cNvPicPr>
+            <a:picLocks noChangeAspect="1"/>
+          </p:cNvPicPr>
+          <p:nvPr/>
+        </p:nvPicPr>
+        <p:blipFill>
+          <a:blip r:embed="rId3"/>
+          <a:stretch>
+            <a:fillRect/>
+          </a:stretch>
+        </p:blipFill>
+        <p:spPr>
+          <a:xfrm>
+            <a:off x="2908300" y="4100512"/>
+            <a:ext cx="3327400" cy="2438400"/>
+          </a:xfrm>
+          <a:prstGeom prst="rect">
+            <a:avLst/>
+          </a:prstGeom>
+        </p:spPr>
+      </p:pic>
     </p:spTree>
     <p:extLst>
       <p:ext uri="{BB962C8B-B14F-4D97-AF65-F5344CB8AC3E}">
@@ -12673,7 +12841,7 @@
         <p:spPr/>
         <p:txBody>
           <a:bodyPr>
-            <a:normAutofit fontScale="92500"/>
+            <a:normAutofit/>
           </a:bodyPr>
           <a:lstStyle/>
           <a:p>
@@ -12767,6 +12935,29 @@
               <a:t> in the programming world), we must enclose the text in quotes. Note that the quotes were not printed to the screen.</a:t>
             </a:r>
             <a:endParaRPr lang="en-US" sz="2800" dirty="0"/>
+          </a:p>
+        </p:txBody>
+      </p:sp>
+      <p:sp>
+        <p:nvSpPr>
+          <p:cNvPr id="8" name="Slide Number Placeholder 7"/>
+          <p:cNvSpPr>
+            <a:spLocks noGrp="1"/>
+          </p:cNvSpPr>
+          <p:nvPr>
+            <p:ph type="sldNum" sz="quarter" idx="12"/>
+          </p:nvPr>
+        </p:nvSpPr>
+        <p:spPr/>
+        <p:txBody>
+          <a:bodyPr/>
+          <a:lstStyle/>
+          <a:p>
+            <a:fld id="{125D8EBD-3626-492B-BEC7-FEAF43DF08E7}" type="slidenum">
+              <a:rPr lang="en-US" smtClean="0"/>
+              <a:t>21</a:t>
+            </a:fld>
+            <a:endParaRPr lang="en-US" dirty="0"/>
           </a:p>
         </p:txBody>
       </p:sp>
@@ -12944,29 +13135,6 @@
               <a:rPr lang="en-US" dirty="0" smtClean="0"/>
               <a:t>"</a:t>
             </a:r>
-            <a:endParaRPr lang="en-US" dirty="0"/>
-          </a:p>
-        </p:txBody>
-      </p:sp>
-      <p:sp>
-        <p:nvSpPr>
-          <p:cNvPr id="8" name="Slide Number Placeholder 7"/>
-          <p:cNvSpPr>
-            <a:spLocks noGrp="1"/>
-          </p:cNvSpPr>
-          <p:nvPr>
-            <p:ph type="sldNum" sz="quarter" idx="12"/>
-          </p:nvPr>
-        </p:nvSpPr>
-        <p:spPr/>
-        <p:txBody>
-          <a:bodyPr/>
-          <a:lstStyle/>
-          <a:p>
-            <a:fld id="{125D8EBD-3626-492B-BEC7-FEAF43DF08E7}" type="slidenum">
-              <a:rPr lang="en-US" smtClean="0"/>
-              <a:t>21</a:t>
-            </a:fld>
             <a:endParaRPr lang="en-US" dirty="0"/>
           </a:p>
         </p:txBody>
@@ -13021,7 +13189,7 @@
         <p:spPr/>
         <p:txBody>
           <a:bodyPr>
-            <a:normAutofit fontScale="90000"/>
+            <a:normAutofit/>
           </a:bodyPr>
           <a:lstStyle/>
           <a:p>
@@ -13373,6 +13541,29 @@
               <a:rPr lang="en-US" dirty="0" smtClean="0"/>
               <a:t>Variations on the print statement</a:t>
             </a:r>
+            <a:endParaRPr lang="en-US" dirty="0"/>
+          </a:p>
+        </p:txBody>
+      </p:sp>
+      <p:sp>
+        <p:nvSpPr>
+          <p:cNvPr id="7" name="Slide Number Placeholder 6"/>
+          <p:cNvSpPr>
+            <a:spLocks noGrp="1"/>
+          </p:cNvSpPr>
+          <p:nvPr>
+            <p:ph type="sldNum" sz="quarter" idx="12"/>
+          </p:nvPr>
+        </p:nvSpPr>
+        <p:spPr/>
+        <p:txBody>
+          <a:bodyPr/>
+          <a:lstStyle/>
+          <a:p>
+            <a:fld id="{125D8EBD-3626-492B-BEC7-FEAF43DF08E7}" type="slidenum">
+              <a:rPr lang="en-US" smtClean="0"/>
+              <a:t>23</a:t>
+            </a:fld>
             <a:endParaRPr lang="en-US" dirty="0"/>
           </a:p>
         </p:txBody>
@@ -15681,29 +15872,6 @@
           </a:p>
         </p:txBody>
       </p:sp>
-      <p:sp>
-        <p:nvSpPr>
-          <p:cNvPr id="7" name="Slide Number Placeholder 6"/>
-          <p:cNvSpPr>
-            <a:spLocks noGrp="1"/>
-          </p:cNvSpPr>
-          <p:nvPr>
-            <p:ph type="sldNum" sz="quarter" idx="12"/>
-          </p:nvPr>
-        </p:nvSpPr>
-        <p:spPr/>
-        <p:txBody>
-          <a:bodyPr/>
-          <a:lstStyle/>
-          <a:p>
-            <a:fld id="{125D8EBD-3626-492B-BEC7-FEAF43DF08E7}" type="slidenum">
-              <a:rPr lang="en-US" smtClean="0"/>
-              <a:t>23</a:t>
-            </a:fld>
-            <a:endParaRPr lang="en-US" dirty="0"/>
-          </a:p>
-        </p:txBody>
-      </p:sp>
     </p:spTree>
     <p:extLst>
       <p:ext uri="{BB962C8B-B14F-4D97-AF65-F5344CB8AC3E}">
@@ -17123,7 +17291,7 @@
         <p:spPr/>
         <p:txBody>
           <a:bodyPr>
-            <a:normAutofit fontScale="90000"/>
+            <a:normAutofit/>
           </a:bodyPr>
           <a:lstStyle/>
           <a:p>
@@ -17308,7 +17476,7 @@
         <p:spPr/>
         <p:txBody>
           <a:bodyPr>
-            <a:normAutofit fontScale="92500" lnSpcReduction="20000"/>
+            <a:normAutofit/>
           </a:bodyPr>
           <a:lstStyle/>
           <a:p>
@@ -17677,6 +17845,29 @@
               <a:latin typeface="Courier New" pitchFamily="49" charset="0"/>
               <a:cs typeface="Courier New" pitchFamily="49" charset="0"/>
             </a:endParaRPr>
+          </a:p>
+        </p:txBody>
+      </p:sp>
+      <p:sp>
+        <p:nvSpPr>
+          <p:cNvPr id="5" name="Slide Number Placeholder 4"/>
+          <p:cNvSpPr>
+            <a:spLocks noGrp="1"/>
+          </p:cNvSpPr>
+          <p:nvPr>
+            <p:ph type="sldNum" sz="quarter" idx="12"/>
+          </p:nvPr>
+        </p:nvSpPr>
+        <p:spPr/>
+        <p:txBody>
+          <a:bodyPr/>
+          <a:lstStyle/>
+          <a:p>
+            <a:fld id="{125D8EBD-3626-492B-BEC7-FEAF43DF08E7}" type="slidenum">
+              <a:rPr lang="en-US" smtClean="0"/>
+              <a:t>32</a:t>
+            </a:fld>
+            <a:endParaRPr lang="en-US" dirty="0"/>
           </a:p>
         </p:txBody>
       </p:sp>
@@ -18038,29 +18229,6 @@
           </p:txBody>
         </p:sp>
       </p:grpSp>
-      <p:sp>
-        <p:nvSpPr>
-          <p:cNvPr id="5" name="Slide Number Placeholder 4"/>
-          <p:cNvSpPr>
-            <a:spLocks noGrp="1"/>
-          </p:cNvSpPr>
-          <p:nvPr>
-            <p:ph type="sldNum" sz="quarter" idx="12"/>
-          </p:nvPr>
-        </p:nvSpPr>
-        <p:spPr/>
-        <p:txBody>
-          <a:bodyPr/>
-          <a:lstStyle/>
-          <a:p>
-            <a:fld id="{125D8EBD-3626-492B-BEC7-FEAF43DF08E7}" type="slidenum">
-              <a:rPr lang="en-US" smtClean="0"/>
-              <a:t>32</a:t>
-            </a:fld>
-            <a:endParaRPr lang="en-US" dirty="0"/>
-          </a:p>
-        </p:txBody>
-      </p:sp>
     </p:spTree>
     <p:extLst>
       <p:ext uri="{BB962C8B-B14F-4D97-AF65-F5344CB8AC3E}">
@@ -18174,6 +18342,29 @@
               <a:latin typeface="Courier New" pitchFamily="49" charset="0"/>
               <a:cs typeface="Courier New" pitchFamily="49" charset="0"/>
             </a:endParaRPr>
+          </a:p>
+        </p:txBody>
+      </p:sp>
+      <p:sp>
+        <p:nvSpPr>
+          <p:cNvPr id="13" name="Slide Number Placeholder 12"/>
+          <p:cNvSpPr>
+            <a:spLocks noGrp="1"/>
+          </p:cNvSpPr>
+          <p:nvPr>
+            <p:ph type="sldNum" sz="quarter" idx="12"/>
+          </p:nvPr>
+        </p:nvSpPr>
+        <p:spPr/>
+        <p:txBody>
+          <a:bodyPr/>
+          <a:lstStyle/>
+          <a:p>
+            <a:fld id="{125D8EBD-3626-492B-BEC7-FEAF43DF08E7}" type="slidenum">
+              <a:rPr lang="en-US" smtClean="0"/>
+              <a:t>33</a:t>
+            </a:fld>
+            <a:endParaRPr lang="en-US" dirty="0"/>
           </a:p>
         </p:txBody>
       </p:sp>
@@ -18339,29 +18530,6 @@
               <a:t>stored in</a:t>
             </a:r>
             <a:endParaRPr lang="en-US" sz="1400" dirty="0"/>
-          </a:p>
-        </p:txBody>
-      </p:sp>
-      <p:sp>
-        <p:nvSpPr>
-          <p:cNvPr id="13" name="Slide Number Placeholder 12"/>
-          <p:cNvSpPr>
-            <a:spLocks noGrp="1"/>
-          </p:cNvSpPr>
-          <p:nvPr>
-            <p:ph type="sldNum" sz="quarter" idx="12"/>
-          </p:nvPr>
-        </p:nvSpPr>
-        <p:spPr/>
-        <p:txBody>
-          <a:bodyPr/>
-          <a:lstStyle/>
-          <a:p>
-            <a:fld id="{125D8EBD-3626-492B-BEC7-FEAF43DF08E7}" type="slidenum">
-              <a:rPr lang="en-US" smtClean="0"/>
-              <a:t>33</a:t>
-            </a:fld>
-            <a:endParaRPr lang="en-US" dirty="0"/>
           </a:p>
         </p:txBody>
       </p:sp>
@@ -18773,7 +18941,7 @@
         <p:spPr/>
         <p:txBody>
           <a:bodyPr>
-            <a:normAutofit fontScale="90000"/>
+            <a:normAutofit/>
           </a:bodyPr>
           <a:lstStyle/>
           <a:p>
@@ -18798,7 +18966,7 @@
         <p:spPr/>
         <p:txBody>
           <a:bodyPr>
-            <a:normAutofit fontScale="70000" lnSpcReduction="20000"/>
+            <a:normAutofit lnSpcReduction="10000"/>
           </a:bodyPr>
           <a:lstStyle/>
           <a:p>
@@ -19342,7 +19510,7 @@
         <p:spPr/>
         <p:txBody>
           <a:bodyPr>
-            <a:normAutofit fontScale="85000" lnSpcReduction="10000"/>
+            <a:normAutofit/>
           </a:bodyPr>
           <a:lstStyle/>
           <a:p>
@@ -19460,6 +19628,29 @@
               <a:rPr lang="en-US" sz="2800" dirty="0" smtClean="0"/>
               <a:t>.</a:t>
             </a:r>
+          </a:p>
+        </p:txBody>
+      </p:sp>
+      <p:sp>
+        <p:nvSpPr>
+          <p:cNvPr id="8" name="Slide Number Placeholder 7"/>
+          <p:cNvSpPr>
+            <a:spLocks noGrp="1"/>
+          </p:cNvSpPr>
+          <p:nvPr>
+            <p:ph type="sldNum" sz="quarter" idx="12"/>
+          </p:nvPr>
+        </p:nvSpPr>
+        <p:spPr/>
+        <p:txBody>
+          <a:bodyPr/>
+          <a:lstStyle/>
+          <a:p>
+            <a:fld id="{125D8EBD-3626-492B-BEC7-FEAF43DF08E7}" type="slidenum">
+              <a:rPr lang="en-US" smtClean="0"/>
+              <a:t>36</a:t>
+            </a:fld>
+            <a:endParaRPr lang="en-US" dirty="0"/>
           </a:p>
         </p:txBody>
       </p:sp>
@@ -22088,29 +22279,6 @@
           </a:p>
         </p:txBody>
       </p:sp>
-      <p:sp>
-        <p:nvSpPr>
-          <p:cNvPr id="8" name="Slide Number Placeholder 7"/>
-          <p:cNvSpPr>
-            <a:spLocks noGrp="1"/>
-          </p:cNvSpPr>
-          <p:nvPr>
-            <p:ph type="sldNum" sz="quarter" idx="12"/>
-          </p:nvPr>
-        </p:nvSpPr>
-        <p:spPr/>
-        <p:txBody>
-          <a:bodyPr/>
-          <a:lstStyle/>
-          <a:p>
-            <a:fld id="{125D8EBD-3626-492B-BEC7-FEAF43DF08E7}" type="slidenum">
-              <a:rPr lang="en-US" smtClean="0"/>
-              <a:t>36</a:t>
-            </a:fld>
-            <a:endParaRPr lang="en-US" dirty="0"/>
-          </a:p>
-        </p:txBody>
-      </p:sp>
     </p:spTree>
     <p:extLst>
       <p:ext uri="{BB962C8B-B14F-4D97-AF65-F5344CB8AC3E}">
@@ -22307,207 +22475,6 @@
           </a:p>
         </p:txBody>
       </p:sp>
-      <p:sp>
-        <p:nvSpPr>
-          <p:cNvPr id="5" name="Subtitle 5"/>
-          <p:cNvSpPr txBox="1">
-            <a:spLocks/>
-          </p:cNvSpPr>
-          <p:nvPr/>
-        </p:nvSpPr>
-        <p:spPr>
-          <a:xfrm>
-            <a:off x="219075" y="5915025"/>
-            <a:ext cx="3914775" cy="790575"/>
-          </a:xfrm>
-          <a:prstGeom prst="rect">
-            <a:avLst/>
-          </a:prstGeom>
-          <a:ln>
-            <a:solidFill>
-              <a:schemeClr val="tx1">
-                <a:lumMod val="50000"/>
-                <a:lumOff val="50000"/>
-              </a:schemeClr>
-            </a:solidFill>
-            <a:prstDash val="sysDot"/>
-          </a:ln>
-        </p:spPr>
-        <p:txBody>
-          <a:bodyPr vert="horz" lIns="91440" tIns="45720" rIns="91440" bIns="45720" rtlCol="0" anchor="ctr">
-            <a:normAutofit/>
-          </a:bodyPr>
-          <a:lstStyle>
-            <a:lvl1pPr marL="342900" indent="-342900" algn="l" defTabSz="914400" rtl="0" eaLnBrk="1" latinLnBrk="0" hangingPunct="1">
-              <a:spcBef>
-                <a:spcPct val="20000"/>
-              </a:spcBef>
-              <a:buFont typeface="Arial" pitchFamily="34" charset="0"/>
-              <a:buChar char="•"/>
-              <a:defRPr sz="3200" kern="1200">
-                <a:solidFill>
-                  <a:schemeClr val="tx1"/>
-                </a:solidFill>
-                <a:latin typeface="+mn-lt"/>
-                <a:ea typeface="+mn-ea"/>
-                <a:cs typeface="+mn-cs"/>
-              </a:defRPr>
-            </a:lvl1pPr>
-            <a:lvl2pPr marL="742950" indent="-285750" algn="l" defTabSz="914400" rtl="0" eaLnBrk="1" latinLnBrk="0" hangingPunct="1">
-              <a:spcBef>
-                <a:spcPct val="20000"/>
-              </a:spcBef>
-              <a:buFont typeface="Arial" pitchFamily="34" charset="0"/>
-              <a:buChar char="–"/>
-              <a:defRPr sz="2800" kern="1200">
-                <a:solidFill>
-                  <a:schemeClr val="tx1"/>
-                </a:solidFill>
-                <a:latin typeface="+mn-lt"/>
-                <a:ea typeface="+mn-ea"/>
-                <a:cs typeface="+mn-cs"/>
-              </a:defRPr>
-            </a:lvl2pPr>
-            <a:lvl3pPr marL="1143000" indent="-228600" algn="l" defTabSz="914400" rtl="0" eaLnBrk="1" latinLnBrk="0" hangingPunct="1">
-              <a:spcBef>
-                <a:spcPct val="20000"/>
-              </a:spcBef>
-              <a:buFont typeface="Arial" pitchFamily="34" charset="0"/>
-              <a:buChar char="•"/>
-              <a:defRPr sz="2400" kern="1200">
-                <a:solidFill>
-                  <a:schemeClr val="tx1"/>
-                </a:solidFill>
-                <a:latin typeface="+mn-lt"/>
-                <a:ea typeface="+mn-ea"/>
-                <a:cs typeface="+mn-cs"/>
-              </a:defRPr>
-            </a:lvl3pPr>
-            <a:lvl4pPr marL="1600200" indent="-228600" algn="l" defTabSz="914400" rtl="0" eaLnBrk="1" latinLnBrk="0" hangingPunct="1">
-              <a:spcBef>
-                <a:spcPct val="20000"/>
-              </a:spcBef>
-              <a:buFont typeface="Arial" pitchFamily="34" charset="0"/>
-              <a:buChar char="–"/>
-              <a:defRPr sz="2000" kern="1200">
-                <a:solidFill>
-                  <a:schemeClr val="tx1"/>
-                </a:solidFill>
-                <a:latin typeface="+mn-lt"/>
-                <a:ea typeface="+mn-ea"/>
-                <a:cs typeface="+mn-cs"/>
-              </a:defRPr>
-            </a:lvl4pPr>
-            <a:lvl5pPr marL="2057400" indent="-228600" algn="l" defTabSz="914400" rtl="0" eaLnBrk="1" latinLnBrk="0" hangingPunct="1">
-              <a:spcBef>
-                <a:spcPct val="20000"/>
-              </a:spcBef>
-              <a:buFont typeface="Arial" pitchFamily="34" charset="0"/>
-              <a:buChar char="»"/>
-              <a:defRPr sz="2000" kern="1200">
-                <a:solidFill>
-                  <a:schemeClr val="tx1"/>
-                </a:solidFill>
-                <a:latin typeface="+mn-lt"/>
-                <a:ea typeface="+mn-ea"/>
-                <a:cs typeface="+mn-cs"/>
-              </a:defRPr>
-            </a:lvl5pPr>
-            <a:lvl6pPr marL="2514600" indent="-228600" algn="l" defTabSz="914400" rtl="0" eaLnBrk="1" latinLnBrk="0" hangingPunct="1">
-              <a:spcBef>
-                <a:spcPct val="20000"/>
-              </a:spcBef>
-              <a:buFont typeface="Arial" pitchFamily="34" charset="0"/>
-              <a:buChar char="•"/>
-              <a:defRPr sz="2000" kern="1200">
-                <a:solidFill>
-                  <a:schemeClr val="tx1"/>
-                </a:solidFill>
-                <a:latin typeface="+mn-lt"/>
-                <a:ea typeface="+mn-ea"/>
-                <a:cs typeface="+mn-cs"/>
-              </a:defRPr>
-            </a:lvl6pPr>
-            <a:lvl7pPr marL="2971800" indent="-228600" algn="l" defTabSz="914400" rtl="0" eaLnBrk="1" latinLnBrk="0" hangingPunct="1">
-              <a:spcBef>
-                <a:spcPct val="20000"/>
-              </a:spcBef>
-              <a:buFont typeface="Arial" pitchFamily="34" charset="0"/>
-              <a:buChar char="•"/>
-              <a:defRPr sz="2000" kern="1200">
-                <a:solidFill>
-                  <a:schemeClr val="tx1"/>
-                </a:solidFill>
-                <a:latin typeface="+mn-lt"/>
-                <a:ea typeface="+mn-ea"/>
-                <a:cs typeface="+mn-cs"/>
-              </a:defRPr>
-            </a:lvl7pPr>
-            <a:lvl8pPr marL="3429000" indent="-228600" algn="l" defTabSz="914400" rtl="0" eaLnBrk="1" latinLnBrk="0" hangingPunct="1">
-              <a:spcBef>
-                <a:spcPct val="20000"/>
-              </a:spcBef>
-              <a:buFont typeface="Arial" pitchFamily="34" charset="0"/>
-              <a:buChar char="•"/>
-              <a:defRPr sz="2000" kern="1200">
-                <a:solidFill>
-                  <a:schemeClr val="tx1"/>
-                </a:solidFill>
-                <a:latin typeface="+mn-lt"/>
-                <a:ea typeface="+mn-ea"/>
-                <a:cs typeface="+mn-cs"/>
-              </a:defRPr>
-            </a:lvl8pPr>
-            <a:lvl9pPr marL="3886200" indent="-228600" algn="l" defTabSz="914400" rtl="0" eaLnBrk="1" latinLnBrk="0" hangingPunct="1">
-              <a:spcBef>
-                <a:spcPct val="20000"/>
-              </a:spcBef>
-              <a:buFont typeface="Arial" pitchFamily="34" charset="0"/>
-              <a:buChar char="•"/>
-              <a:defRPr sz="2000" kern="1200">
-                <a:solidFill>
-                  <a:schemeClr val="tx1"/>
-                </a:solidFill>
-                <a:latin typeface="+mn-lt"/>
-                <a:ea typeface="+mn-ea"/>
-                <a:cs typeface="+mn-cs"/>
-              </a:defRPr>
-            </a:lvl9pPr>
-          </a:lstStyle>
-          <a:p>
-            <a:pPr marL="0" indent="0">
-              <a:buNone/>
-            </a:pPr>
-            <a:r>
-              <a:rPr lang="en-US" sz="1800" dirty="0" smtClean="0">
-                <a:latin typeface="Calibri Light" panose="020F0302020204030204" pitchFamily="34" charset="0"/>
-              </a:rPr>
-              <a:t>Optional: enter your answers online!</a:t>
-            </a:r>
-          </a:p>
-          <a:p>
-            <a:pPr marL="0" indent="0">
-              <a:buNone/>
-            </a:pPr>
-            <a:r>
-              <a:rPr lang="en-US" sz="1600" dirty="0" smtClean="0">
-                <a:latin typeface="Calibri Light" panose="020F0302020204030204" pitchFamily="34" charset="0"/>
-                <a:hlinkClick r:id="rId3"/>
-              </a:rPr>
-              <a:t>https://goo.gl/forms/pmMzT8o1qyQhzmNA3</a:t>
-            </a:r>
-            <a:r>
-              <a:rPr lang="en-US" sz="1600" dirty="0" smtClean="0">
-                <a:latin typeface="Calibri Light" panose="020F0302020204030204" pitchFamily="34" charset="0"/>
-              </a:rPr>
-              <a:t> </a:t>
-            </a:r>
-            <a:endParaRPr lang="en-US" sz="1600" dirty="0">
-              <a:latin typeface="Calibri Light" panose="020F0302020204030204" pitchFamily="34" charset="0"/>
-            </a:endParaRPr>
-          </a:p>
-        </p:txBody>
-      </p:sp>
     </p:spTree>
     <p:extLst>
       <p:ext uri="{BB962C8B-B14F-4D97-AF65-F5344CB8AC3E}">
@@ -23044,14 +23011,26 @@
           <a:p>
             <a:r>
               <a:rPr lang="en-US" dirty="0" smtClean="0"/>
-              <a:t>I will color certain pieces of code in different colors for clarity. For example: </a:t>
+              <a:t>Color Codes:</a:t>
             </a:r>
           </a:p>
           <a:p>
             <a:pPr lvl="1"/>
             <a:r>
               <a:rPr lang="en-US" dirty="0" smtClean="0"/>
-              <a:t>code comments will be </a:t>
+              <a:t>code </a:t>
+            </a:r>
+            <a:r>
+              <a:rPr lang="en-US" dirty="0" smtClean="0">
+                <a:solidFill>
+                  <a:srgbClr val="FF0000"/>
+                </a:solidFill>
+              </a:rPr>
+              <a:t>comments</a:t>
+            </a:r>
+            <a:r>
+              <a:rPr lang="en-US" dirty="0" smtClean="0"/>
+              <a:t> will be </a:t>
             </a:r>
             <a:r>
               <a:rPr lang="en-US" dirty="0" smtClean="0">
@@ -23071,8 +23050,28 @@
           <a:p>
             <a:pPr lvl="1"/>
             <a:r>
+              <a:rPr lang="en-US" dirty="0" smtClean="0">
+                <a:solidFill>
+                  <a:srgbClr val="FF0000"/>
+                </a:solidFill>
+              </a:rPr>
+              <a:t>reserved words </a:t>
+            </a:r>
+            <a:r>
               <a:rPr lang="en-US" dirty="0" smtClean="0"/>
-              <a:t>reserved words and built-in functions will be </a:t>
+              <a:t>and </a:t>
+            </a:r>
+            <a:r>
+              <a:rPr lang="en-US" dirty="0" smtClean="0">
+                <a:solidFill>
+                  <a:srgbClr val="FF0000"/>
+                </a:solidFill>
+              </a:rPr>
+              <a:t>built-in functions </a:t>
+            </a:r>
+            <a:r>
+              <a:rPr lang="en-US" dirty="0" smtClean="0"/>
+              <a:t>will be </a:t>
             </a:r>
             <a:r>
               <a:rPr lang="en-US" dirty="0" smtClean="0">
@@ -25481,7 +25480,7 @@
               <a:rPr lang="en-US" dirty="0" smtClean="0">
                 <a:latin typeface="Calibri Light" panose="020F0302020204030204" pitchFamily="34" charset="0"/>
               </a:rPr>
-              <a:t>Programming Bootcamp 2016</a:t>
+              <a:t>Programming Bootcamp 2017</a:t>
             </a:r>
           </a:p>
           <a:p>
@@ -25489,7 +25488,7 @@
               <a:rPr lang="en-US" dirty="0" smtClean="0">
                 <a:latin typeface="Calibri Light" panose="020F0302020204030204" pitchFamily="34" charset="0"/>
               </a:rPr>
-              <a:t>Day 1 – 9/6/16</a:t>
+              <a:t>Session 1 – 9/5/17</a:t>
             </a:r>
             <a:endParaRPr lang="en-US" dirty="0">
               <a:latin typeface="Calibri Light" panose="020F0302020204030204" pitchFamily="34" charset="0"/>
@@ -27637,7 +27636,7 @@
         <p:spPr/>
         <p:txBody>
           <a:bodyPr>
-            <a:normAutofit fontScale="70000" lnSpcReduction="20000"/>
+            <a:normAutofit/>
           </a:bodyPr>
           <a:lstStyle/>
           <a:p>
@@ -29037,7 +29036,7 @@
         </p:spPr>
         <p:txBody>
           <a:bodyPr>
-            <a:normAutofit fontScale="92500" lnSpcReduction="10000"/>
+            <a:normAutofit/>
           </a:bodyPr>
           <a:lstStyle/>
           <a:p>
@@ -30338,6 +30337,29 @@
               <a:rPr lang="en-US" dirty="0" smtClean="0"/>
               <a:t>List of math operators</a:t>
             </a:r>
+            <a:endParaRPr lang="en-US" dirty="0"/>
+          </a:p>
+        </p:txBody>
+      </p:sp>
+      <p:sp>
+        <p:nvSpPr>
+          <p:cNvPr id="5" name="Slide Number Placeholder 4"/>
+          <p:cNvSpPr>
+            <a:spLocks noGrp="1"/>
+          </p:cNvSpPr>
+          <p:nvPr>
+            <p:ph type="sldNum" sz="quarter" idx="12"/>
+          </p:nvPr>
+        </p:nvSpPr>
+        <p:spPr/>
+        <p:txBody>
+          <a:bodyPr/>
+          <a:lstStyle/>
+          <a:p>
+            <a:fld id="{125D8EBD-3626-492B-BEC7-FEAF43DF08E7}" type="slidenum">
+              <a:rPr lang="en-US" smtClean="0"/>
+              <a:t>65</a:t>
+            </a:fld>
             <a:endParaRPr lang="en-US" dirty="0"/>
           </a:p>
         </p:txBody>
@@ -30901,29 +30923,6 @@
           </a:p>
         </p:txBody>
       </p:sp>
-      <p:sp>
-        <p:nvSpPr>
-          <p:cNvPr id="5" name="Slide Number Placeholder 4"/>
-          <p:cNvSpPr>
-            <a:spLocks noGrp="1"/>
-          </p:cNvSpPr>
-          <p:nvPr>
-            <p:ph type="sldNum" sz="quarter" idx="12"/>
-          </p:nvPr>
-        </p:nvSpPr>
-        <p:spPr/>
-        <p:txBody>
-          <a:bodyPr/>
-          <a:lstStyle/>
-          <a:p>
-            <a:fld id="{125D8EBD-3626-492B-BEC7-FEAF43DF08E7}" type="slidenum">
-              <a:rPr lang="en-US" smtClean="0"/>
-              <a:t>65</a:t>
-            </a:fld>
-            <a:endParaRPr lang="en-US" dirty="0"/>
-          </a:p>
-        </p:txBody>
-      </p:sp>
     </p:spTree>
     <p:extLst>
       <p:ext uri="{BB962C8B-B14F-4D97-AF65-F5344CB8AC3E}">
@@ -31254,7 +31253,7 @@
         </p:spPr>
         <p:txBody>
           <a:bodyPr>
-            <a:normAutofit fontScale="92500" lnSpcReduction="10000"/>
+            <a:normAutofit/>
           </a:bodyPr>
           <a:lstStyle/>
           <a:p>
@@ -31391,44 +31390,44 @@
         <a:sysClr val="window" lastClr="FFFFFF"/>
       </a:lt1>
       <a:dk2>
-        <a:srgbClr val="1F497D"/>
+        <a:srgbClr val="44546A"/>
       </a:dk2>
       <a:lt2>
-        <a:srgbClr val="EEECE1"/>
+        <a:srgbClr val="E7E6E6"/>
       </a:lt2>
       <a:accent1>
-        <a:srgbClr val="4F81BD"/>
+        <a:srgbClr val="5B9BD5"/>
       </a:accent1>
       <a:accent2>
-        <a:srgbClr val="C0504D"/>
+        <a:srgbClr val="ED7D31"/>
       </a:accent2>
       <a:accent3>
-        <a:srgbClr val="9BBB59"/>
+        <a:srgbClr val="A5A5A5"/>
       </a:accent3>
       <a:accent4>
-        <a:srgbClr val="8064A2"/>
+        <a:srgbClr val="FFC000"/>
       </a:accent4>
       <a:accent5>
-        <a:srgbClr val="4BACC6"/>
+        <a:srgbClr val="4472C4"/>
       </a:accent5>
       <a:accent6>
-        <a:srgbClr val="F79646"/>
+        <a:srgbClr val="70AD47"/>
       </a:accent6>
       <a:hlink>
-        <a:srgbClr val="0000FF"/>
+        <a:srgbClr val="0563C1"/>
       </a:hlink>
       <a:folHlink>
-        <a:srgbClr val="800080"/>
+        <a:srgbClr val="954F72"/>
       </a:folHlink>
     </a:clrScheme>
     <a:fontScheme name="Office">
       <a:majorFont>
-        <a:latin typeface="Calibri"/>
+        <a:latin typeface="Calibri Light" panose="020F0302020204030204"/>
         <a:ea typeface=""/>
         <a:cs typeface=""/>
-        <a:font script="Jpan" typeface="ＭＳ Ｐゴシック"/>
+        <a:font script="Jpan" typeface="Yu Gothic Light"/>
         <a:font script="Hang" typeface="맑은 고딕"/>
-        <a:font script="Hans" typeface="宋体"/>
+        <a:font script="Hans" typeface="DengXian Light"/>
         <a:font script="Hant" typeface="新細明體"/>
         <a:font script="Arab" typeface="Times New Roman"/>
         <a:font script="Hebr" typeface="Times New Roman"/>
@@ -31458,12 +31457,12 @@
         <a:font script="Geor" typeface="Sylfaen"/>
       </a:majorFont>
       <a:minorFont>
-        <a:latin typeface="Calibri"/>
+        <a:latin typeface="Calibri" panose="020F0502020204030204"/>
         <a:ea typeface=""/>
         <a:cs typeface=""/>
-        <a:font script="Jpan" typeface="ＭＳ Ｐゴシック"/>
+        <a:font script="Jpan" typeface="Yu Gothic"/>
         <a:font script="Hang" typeface="맑은 고딕"/>
-        <a:font script="Hans" typeface="宋体"/>
+        <a:font script="Hans" typeface="DengXian"/>
         <a:font script="Hant" typeface="新細明體"/>
         <a:font script="Arab" typeface="Arial"/>
         <a:font script="Hebr" typeface="Arial"/>
@@ -31502,166 +31501,142 @@
           <a:gsLst>
             <a:gs pos="0">
               <a:schemeClr val="phClr">
-                <a:tint val="50000"/>
-                <a:satMod val="300000"/>
+                <a:lumMod val="110000"/>
+                <a:satMod val="105000"/>
+                <a:tint val="67000"/>
               </a:schemeClr>
             </a:gs>
-            <a:gs pos="35000">
+            <a:gs pos="50000">
               <a:schemeClr val="phClr">
-                <a:tint val="37000"/>
-                <a:satMod val="300000"/>
+                <a:lumMod val="105000"/>
+                <a:satMod val="103000"/>
+                <a:tint val="73000"/>
               </a:schemeClr>
             </a:gs>
             <a:gs pos="100000">
               <a:schemeClr val="phClr">
-                <a:tint val="15000"/>
-                <a:satMod val="350000"/>
+                <a:lumMod val="105000"/>
+                <a:satMod val="109000"/>
+                <a:tint val="81000"/>
               </a:schemeClr>
             </a:gs>
           </a:gsLst>
-          <a:lin ang="16200000" scaled="1"/>
+          <a:lin ang="5400000" scaled="0"/>
         </a:gradFill>
         <a:gradFill rotWithShape="1">
           <a:gsLst>
             <a:gs pos="0">
               <a:schemeClr val="phClr">
-                <a:shade val="51000"/>
-                <a:satMod val="130000"/>
+                <a:satMod val="103000"/>
+                <a:lumMod val="102000"/>
+                <a:tint val="94000"/>
               </a:schemeClr>
             </a:gs>
-            <a:gs pos="80000">
+            <a:gs pos="50000">
               <a:schemeClr val="phClr">
-                <a:shade val="93000"/>
-                <a:satMod val="130000"/>
+                <a:satMod val="110000"/>
+                <a:lumMod val="100000"/>
+                <a:shade val="100000"/>
               </a:schemeClr>
             </a:gs>
             <a:gs pos="100000">
               <a:schemeClr val="phClr">
-                <a:shade val="94000"/>
-                <a:satMod val="135000"/>
+                <a:lumMod val="99000"/>
+                <a:satMod val="120000"/>
+                <a:shade val="78000"/>
               </a:schemeClr>
             </a:gs>
           </a:gsLst>
-          <a:lin ang="16200000" scaled="0"/>
+          <a:lin ang="5400000" scaled="0"/>
         </a:gradFill>
       </a:fillStyleLst>
       <a:lnStyleLst>
-        <a:ln w="9525" cap="flat" cmpd="sng" algn="ctr">
-          <a:solidFill>
-            <a:schemeClr val="phClr">
-              <a:shade val="95000"/>
-              <a:satMod val="105000"/>
-            </a:schemeClr>
-          </a:solidFill>
-          <a:prstDash val="solid"/>
-        </a:ln>
-        <a:ln w="25400" cap="flat" cmpd="sng" algn="ctr">
+        <a:ln w="6350" cap="flat" cmpd="sng" algn="ctr">
           <a:solidFill>
             <a:schemeClr val="phClr"/>
           </a:solidFill>
           <a:prstDash val="solid"/>
+          <a:miter lim="800000"/>
         </a:ln>
-        <a:ln w="38100" cap="flat" cmpd="sng" algn="ctr">
+        <a:ln w="12700" cap="flat" cmpd="sng" algn="ctr">
           <a:solidFill>
             <a:schemeClr val="phClr"/>
           </a:solidFill>
           <a:prstDash val="solid"/>
+          <a:miter lim="800000"/>
+        </a:ln>
+        <a:ln w="19050" cap="flat" cmpd="sng" algn="ctr">
+          <a:solidFill>
+            <a:schemeClr val="phClr"/>
+          </a:solidFill>
+          <a:prstDash val="solid"/>
+          <a:miter lim="800000"/>
         </a:ln>
       </a:lnStyleLst>
       <a:effectStyleLst>
         <a:effectStyle>
+          <a:effectLst/>
+        </a:effectStyle>
+        <a:effectStyle>
+          <a:effectLst/>
+        </a:effectStyle>
+        <a:effectStyle>
           <a:effectLst>
-            <a:outerShdw blurRad="40000" dist="20000" dir="5400000" rotWithShape="0">
+            <a:outerShdw blurRad="57150" dist="19050" dir="5400000" algn="ctr" rotWithShape="0">
               <a:srgbClr val="000000">
-                <a:alpha val="38000"/>
+                <a:alpha val="63000"/>
               </a:srgbClr>
             </a:outerShdw>
           </a:effectLst>
-        </a:effectStyle>
-        <a:effectStyle>
-          <a:effectLst>
-            <a:outerShdw blurRad="40000" dist="23000" dir="5400000" rotWithShape="0">
-              <a:srgbClr val="000000">
-                <a:alpha val="35000"/>
-              </a:srgbClr>
-            </a:outerShdw>
-          </a:effectLst>
-        </a:effectStyle>
-        <a:effectStyle>
-          <a:effectLst>
-            <a:outerShdw blurRad="40000" dist="23000" dir="5400000" rotWithShape="0">
-              <a:srgbClr val="000000">
-                <a:alpha val="35000"/>
-              </a:srgbClr>
-            </a:outerShdw>
-          </a:effectLst>
-          <a:scene3d>
-            <a:camera prst="orthographicFront">
-              <a:rot lat="0" lon="0" rev="0"/>
-            </a:camera>
-            <a:lightRig rig="threePt" dir="t">
-              <a:rot lat="0" lon="0" rev="1200000"/>
-            </a:lightRig>
-          </a:scene3d>
-          <a:sp3d>
-            <a:bevelT w="63500" h="25400"/>
-          </a:sp3d>
         </a:effectStyle>
       </a:effectStyleLst>
       <a:bgFillStyleLst>
         <a:solidFill>
           <a:schemeClr val="phClr"/>
         </a:solidFill>
+        <a:solidFill>
+          <a:schemeClr val="phClr">
+            <a:tint val="95000"/>
+            <a:satMod val="170000"/>
+          </a:schemeClr>
+        </a:solidFill>
         <a:gradFill rotWithShape="1">
           <a:gsLst>
             <a:gs pos="0">
               <a:schemeClr val="phClr">
-                <a:tint val="40000"/>
-                <a:satMod val="350000"/>
+                <a:tint val="93000"/>
+                <a:satMod val="150000"/>
+                <a:shade val="98000"/>
+                <a:lumMod val="102000"/>
               </a:schemeClr>
             </a:gs>
-            <a:gs pos="40000">
+            <a:gs pos="50000">
               <a:schemeClr val="phClr">
-                <a:tint val="45000"/>
-                <a:shade val="99000"/>
-                <a:satMod val="350000"/>
+                <a:tint val="98000"/>
+                <a:satMod val="130000"/>
+                <a:shade val="90000"/>
+                <a:lumMod val="103000"/>
               </a:schemeClr>
             </a:gs>
             <a:gs pos="100000">
               <a:schemeClr val="phClr">
-                <a:shade val="20000"/>
-                <a:satMod val="255000"/>
+                <a:shade val="63000"/>
+                <a:satMod val="120000"/>
               </a:schemeClr>
             </a:gs>
           </a:gsLst>
-          <a:path path="circle">
-            <a:fillToRect l="50000" t="-80000" r="50000" b="180000"/>
-          </a:path>
-        </a:gradFill>
-        <a:gradFill rotWithShape="1">
-          <a:gsLst>
-            <a:gs pos="0">
-              <a:schemeClr val="phClr">
-                <a:tint val="80000"/>
-                <a:satMod val="300000"/>
-              </a:schemeClr>
-            </a:gs>
-            <a:gs pos="100000">
-              <a:schemeClr val="phClr">
-                <a:shade val="30000"/>
-                <a:satMod val="200000"/>
-              </a:schemeClr>
-            </a:gs>
-          </a:gsLst>
-          <a:path path="circle">
-            <a:fillToRect l="50000" t="50000" r="50000" b="50000"/>
-          </a:path>
+          <a:lin ang="5400000" scaled="0"/>
         </a:gradFill>
       </a:bgFillStyleLst>
     </a:fmtScheme>
   </a:themeElements>
   <a:objectDefaults/>
   <a:extraClrSchemeLst/>
+  <a:extLst>
+    <a:ext uri="{05A4C25C-085E-4340-85A3-A5531E510DB2}">
+      <thm15:themeFamily xmlns:thm15="http://schemas.microsoft.com/office/thememl/2012/main" name="Office Theme" id="{62F939B6-93AF-4DB8-9C6B-D6C7DFDC589F}" vid="{4A3C46E8-61CC-4603-A589-7422A47A8E4A}"/>
+    </a:ext>
+  </a:extLst>
 </a:theme>
 </file>
 

</xml_diff>